<commit_message>
fixing slides for recursion intro
</commit_message>
<xml_diff>
--- a/ClassMaterials/RecursionIntroduction/Slides/Part1-Recursion.pptx
+++ b/ClassMaterials/RecursionIntroduction/Slides/Part1-Recursion.pptx
@@ -5,10 +5,10 @@
     <p:sldMasterId id="2147484431" r:id="rId4"/>
   </p:sldMasterIdLst>
   <p:notesMasterIdLst>
-    <p:notesMasterId r:id="rId20"/>
+    <p:notesMasterId r:id="rId24"/>
   </p:notesMasterIdLst>
   <p:handoutMasterIdLst>
-    <p:handoutMasterId r:id="rId21"/>
+    <p:handoutMasterId r:id="rId25"/>
   </p:handoutMasterIdLst>
   <p:sldIdLst>
     <p:sldId id="401" r:id="rId5"/>
@@ -16,16 +16,20 @@
     <p:sldId id="400" r:id="rId7"/>
     <p:sldId id="379" r:id="rId8"/>
     <p:sldId id="378" r:id="rId9"/>
-    <p:sldId id="372" r:id="rId10"/>
-    <p:sldId id="385" r:id="rId11"/>
-    <p:sldId id="389" r:id="rId12"/>
-    <p:sldId id="408" r:id="rId13"/>
-    <p:sldId id="403" r:id="rId14"/>
-    <p:sldId id="404" r:id="rId15"/>
-    <p:sldId id="405" r:id="rId16"/>
-    <p:sldId id="406" r:id="rId17"/>
-    <p:sldId id="407" r:id="rId18"/>
-    <p:sldId id="409" r:id="rId19"/>
+    <p:sldId id="412" r:id="rId10"/>
+    <p:sldId id="372" r:id="rId11"/>
+    <p:sldId id="413" r:id="rId12"/>
+    <p:sldId id="385" r:id="rId13"/>
+    <p:sldId id="411" r:id="rId14"/>
+    <p:sldId id="389" r:id="rId15"/>
+    <p:sldId id="408" r:id="rId16"/>
+    <p:sldId id="403" r:id="rId17"/>
+    <p:sldId id="404" r:id="rId18"/>
+    <p:sldId id="405" r:id="rId19"/>
+    <p:sldId id="406" r:id="rId20"/>
+    <p:sldId id="407" r:id="rId21"/>
+    <p:sldId id="409" r:id="rId22"/>
+    <p:sldId id="414" r:id="rId23"/>
   </p:sldIdLst>
   <p:sldSz cx="9144000" cy="6858000" type="screen4x3"/>
   <p:notesSz cx="7010400" cy="9296400"/>
@@ -176,22 +180,6 @@
 <file path=ppt/changesInfos/changesInfo1.xml><?xml version="1.0" encoding="utf-8"?>
 <pc:chgInfo xmlns:a="http://schemas.openxmlformats.org/drawingml/2006/main" xmlns:r="http://schemas.openxmlformats.org/officeDocument/2006/relationships" xmlns:ac="http://schemas.microsoft.com/office/drawing/2013/main/command" xmlns:pc="http://schemas.microsoft.com/office/powerpoint/2013/main/command">
   <pc:docChgLst>
-    <pc:chgData name="Lane, Kaylee" userId="S::laneks@rose-hulman.edu::7e553024-0d5a-4ee2-bb3e-1ec29fcc1911" providerId="AD" clId="Web-{D4BB7AF9-EA86-E8EB-B7FF-F71ECB8F38EE}"/>
-    <pc:docChg chg="sldOrd">
-      <pc:chgData name="Lane, Kaylee" userId="S::laneks@rose-hulman.edu::7e553024-0d5a-4ee2-bb3e-1ec29fcc1911" providerId="AD" clId="Web-{D4BB7AF9-EA86-E8EB-B7FF-F71ECB8F38EE}" dt="2022-01-26T14:32:44.642" v="0"/>
-      <pc:docMkLst>
-        <pc:docMk/>
-      </pc:docMkLst>
-      <pc:sldChg chg="ord">
-        <pc:chgData name="Lane, Kaylee" userId="S::laneks@rose-hulman.edu::7e553024-0d5a-4ee2-bb3e-1ec29fcc1911" providerId="AD" clId="Web-{D4BB7AF9-EA86-E8EB-B7FF-F71ECB8F38EE}" dt="2022-01-26T14:32:44.642" v="0"/>
-        <pc:sldMkLst>
-          <pc:docMk/>
-          <pc:sldMk cId="3815621099" sldId="385"/>
-        </pc:sldMkLst>
-      </pc:sldChg>
-    </pc:docChg>
-  </pc:docChgLst>
-  <pc:docChgLst>
     <pc:chgData name="Yoder, Jason" userId="28f4d4d8-da04-4f86-b14d-a21675737bc5" providerId="ADAL" clId="{59563066-D183-4244-8D78-4F520F295B04}"/>
     <pc:docChg chg="modSld">
       <pc:chgData name="Yoder, Jason" userId="28f4d4d8-da04-4f86-b14d-a21675737bc5" providerId="ADAL" clId="{59563066-D183-4244-8D78-4F520F295B04}" dt="2023-11-21T17:19:15.182" v="71" actId="1076"/>
@@ -235,6 +223,22 @@
         <pc:sldMkLst>
           <pc:docMk/>
           <pc:sldMk cId="375092834" sldId="389"/>
+        </pc:sldMkLst>
+      </pc:sldChg>
+    </pc:docChg>
+  </pc:docChgLst>
+  <pc:docChgLst>
+    <pc:chgData name="Lane, Kaylee" userId="S::laneks@rose-hulman.edu::7e553024-0d5a-4ee2-bb3e-1ec29fcc1911" providerId="AD" clId="Web-{D4BB7AF9-EA86-E8EB-B7FF-F71ECB8F38EE}"/>
+    <pc:docChg chg="sldOrd">
+      <pc:chgData name="Lane, Kaylee" userId="S::laneks@rose-hulman.edu::7e553024-0d5a-4ee2-bb3e-1ec29fcc1911" providerId="AD" clId="Web-{D4BB7AF9-EA86-E8EB-B7FF-F71ECB8F38EE}" dt="2022-01-26T14:32:44.642" v="0"/>
+      <pc:docMkLst>
+        <pc:docMk/>
+      </pc:docMkLst>
+      <pc:sldChg chg="ord">
+        <pc:chgData name="Lane, Kaylee" userId="S::laneks@rose-hulman.edu::7e553024-0d5a-4ee2-bb3e-1ec29fcc1911" providerId="AD" clId="Web-{D4BB7AF9-EA86-E8EB-B7FF-F71ECB8F38EE}" dt="2022-01-26T14:32:44.642" v="0"/>
+        <pc:sldMkLst>
+          <pc:docMk/>
+          <pc:sldMk cId="3815621099" sldId="385"/>
         </pc:sldMkLst>
       </pc:sldChg>
     </pc:docChg>
@@ -383,7 +387,7 @@
               <a:pPr>
                 <a:defRPr/>
               </a:pPr>
-              <a:t>11/21/2023</a:t>
+              <a:t>1/15/2024</a:t>
             </a:fld>
             <a:endParaRPr lang="en-US"/>
           </a:p>
@@ -618,7 +622,7 @@
               <a:pPr>
                 <a:defRPr/>
               </a:pPr>
-              <a:t>11/21/2023</a:t>
+              <a:t>1/15/2024</a:t>
             </a:fld>
             <a:endParaRPr lang="en-US"/>
           </a:p>
@@ -2038,7 +2042,7 @@
                 <a:latin typeface="Calibri" pitchFamily="-106" charset="0"/>
               </a:rPr>
               <a:pPr/>
-              <a:t>6</a:t>
+              <a:t>7</a:t>
             </a:fld>
             <a:endParaRPr lang="en-US">
               <a:latin typeface="Calibri" pitchFamily="-106" charset="0"/>
@@ -2339,7 +2343,7 @@
                 <a:latin typeface="Calibri" pitchFamily="34" charset="0"/>
               </a:rPr>
               <a:pPr eaLnBrk="1" hangingPunct="1"/>
-              <a:t>7</a:t>
+              <a:t>9</a:t>
             </a:fld>
             <a:endParaRPr lang="en-US">
               <a:latin typeface="Calibri" pitchFamily="34" charset="0"/>
@@ -2379,6 +2383,307 @@
       </p:grpSpPr>
       <p:sp>
         <p:nvSpPr>
+          <p:cNvPr id="28674" name="Slide Image Placeholder 1"/>
+          <p:cNvSpPr>
+            <a:spLocks noGrp="1" noRot="1" noChangeAspect="1" noTextEdit="1"/>
+          </p:cNvSpPr>
+          <p:nvPr>
+            <p:ph type="sldImg"/>
+          </p:nvPr>
+        </p:nvSpPr>
+        <p:spPr bwMode="auto">
+          <a:noFill/>
+          <a:ln>
+            <a:solidFill>
+              <a:srgbClr val="000000"/>
+            </a:solidFill>
+            <a:miter lim="800000"/>
+            <a:headEnd/>
+            <a:tailEnd/>
+          </a:ln>
+          <a:extLst>
+            <a:ext uri="{909E8E84-426E-40dd-AFC4-6F175D3DCCD1}">
+              <a14:hiddenFill xmlns="" xmlns:a14="http://schemas.microsoft.com/office/drawing/2010/main">
+                <a:solidFill>
+                  <a:srgbClr val="FFFFFF"/>
+                </a:solidFill>
+              </a14:hiddenFill>
+            </a:ext>
+          </a:extLst>
+        </p:spPr>
+      </p:sp>
+      <p:sp>
+        <p:nvSpPr>
+          <p:cNvPr id="28675" name="Notes Placeholder 2"/>
+          <p:cNvSpPr>
+            <a:spLocks noGrp="1"/>
+          </p:cNvSpPr>
+          <p:nvPr>
+            <p:ph type="body" idx="1"/>
+          </p:nvPr>
+        </p:nvSpPr>
+        <p:spPr>
+          <a:noFill/>
+          <a:ln/>
+          <a:extLst>
+            <a:ext uri="{909E8E84-426E-40dd-AFC4-6F175D3DCCD1}">
+              <a14:hiddenFill xmlns="" xmlns:a14="http://schemas.microsoft.com/office/drawing/2010/main">
+                <a:solidFill>
+                  <a:srgbClr val="FFFFFF"/>
+                </a:solidFill>
+              </a14:hiddenFill>
+            </a:ext>
+            <a:ext uri="{91240B29-F687-4f45-9708-019B960494DF}">
+              <a14:hiddenLine xmlns="" xmlns:a14="http://schemas.microsoft.com/office/drawing/2010/main" w="9525">
+                <a:solidFill>
+                  <a:srgbClr val="000000"/>
+                </a:solidFill>
+                <a:miter lim="800000"/>
+                <a:headEnd/>
+                <a:tailEnd/>
+              </a14:hiddenLine>
+            </a:ext>
+          </a:extLst>
+        </p:spPr>
+        <p:txBody>
+          <a:bodyPr/>
+          <a:lstStyle/>
+          <a:p>
+            <a:r>
+              <a:rPr lang="en-US" dirty="0"/>
+              <a:t>Live code the solution.</a:t>
+            </a:r>
+          </a:p>
+          <a:p>
+            <a:endParaRPr lang="en-US" dirty="0"/>
+          </a:p>
+          <a:p>
+            <a:r>
+              <a:rPr lang="en-US" dirty="0"/>
+              <a:t>*Buffalo</a:t>
+            </a:r>
+            <a:r>
+              <a:rPr lang="en-US" baseline="0" dirty="0"/>
+              <a:t> says* I prefer simple palindrome</a:t>
+            </a:r>
+          </a:p>
+          <a:p>
+            <a:endParaRPr lang="en-US" dirty="0"/>
+          </a:p>
+          <a:p>
+            <a:r>
+              <a:rPr lang="en-US" dirty="0"/>
+              <a:t>- What are the simplest cases? These are the base cases.</a:t>
+            </a:r>
+          </a:p>
+          <a:p>
+            <a:pPr>
+              <a:buFontTx/>
+              <a:buChar char="-"/>
+            </a:pPr>
+            <a:r>
+              <a:rPr lang="en-US" dirty="0"/>
+              <a:t>If we aren’t in a simplest case, how can we make progress to a smaller problem?</a:t>
+            </a:r>
+          </a:p>
+          <a:p>
+            <a:pPr>
+              <a:buFontTx/>
+              <a:buChar char="-"/>
+            </a:pPr>
+            <a:endParaRPr lang="en-US" dirty="0"/>
+          </a:p>
+        </p:txBody>
+      </p:sp>
+      <p:sp>
+        <p:nvSpPr>
+          <p:cNvPr id="28676" name="Slide Number Placeholder 3"/>
+          <p:cNvSpPr>
+            <a:spLocks noGrp="1"/>
+          </p:cNvSpPr>
+          <p:nvPr>
+            <p:ph type="sldNum" sz="quarter" idx="5"/>
+          </p:nvPr>
+        </p:nvSpPr>
+        <p:spPr>
+          <a:noFill/>
+          <a:ln/>
+          <a:extLst>
+            <a:ext uri="{909E8E84-426E-40dd-AFC4-6F175D3DCCD1}">
+              <a14:hiddenFill xmlns="" xmlns:a14="http://schemas.microsoft.com/office/drawing/2010/main">
+                <a:solidFill>
+                  <a:srgbClr val="FFFFFF"/>
+                </a:solidFill>
+              </a14:hiddenFill>
+            </a:ext>
+            <a:ext uri="{91240B29-F687-4f45-9708-019B960494DF}">
+              <a14:hiddenLine xmlns="" xmlns:a14="http://schemas.microsoft.com/office/drawing/2010/main" w="9525">
+                <a:solidFill>
+                  <a:srgbClr val="000000"/>
+                </a:solidFill>
+                <a:miter lim="800000"/>
+                <a:headEnd/>
+                <a:tailEnd/>
+              </a14:hiddenLine>
+            </a:ext>
+          </a:extLst>
+        </p:spPr>
+        <p:txBody>
+          <a:bodyPr/>
+          <a:lstStyle>
+            <a:lvl1pPr defTabSz="921052" eaLnBrk="0" hangingPunct="0">
+              <a:defRPr>
+                <a:solidFill>
+                  <a:schemeClr val="tx1"/>
+                </a:solidFill>
+                <a:latin typeface="Arial" charset="0"/>
+                <a:cs typeface="Arial" charset="0"/>
+              </a:defRPr>
+            </a:lvl1pPr>
+            <a:lvl2pPr marL="722031" indent="-277703" defTabSz="921052" eaLnBrk="0" hangingPunct="0">
+              <a:defRPr>
+                <a:solidFill>
+                  <a:schemeClr val="tx1"/>
+                </a:solidFill>
+                <a:latin typeface="Arial" charset="0"/>
+                <a:cs typeface="Arial" charset="0"/>
+              </a:defRPr>
+            </a:lvl2pPr>
+            <a:lvl3pPr marL="1110816" indent="-222164" defTabSz="921052" eaLnBrk="0" hangingPunct="0">
+              <a:defRPr>
+                <a:solidFill>
+                  <a:schemeClr val="tx1"/>
+                </a:solidFill>
+                <a:latin typeface="Arial" charset="0"/>
+                <a:cs typeface="Arial" charset="0"/>
+              </a:defRPr>
+            </a:lvl3pPr>
+            <a:lvl4pPr marL="1555142" indent="-222164" defTabSz="921052" eaLnBrk="0" hangingPunct="0">
+              <a:defRPr>
+                <a:solidFill>
+                  <a:schemeClr val="tx1"/>
+                </a:solidFill>
+                <a:latin typeface="Arial" charset="0"/>
+                <a:cs typeface="Arial" charset="0"/>
+              </a:defRPr>
+            </a:lvl4pPr>
+            <a:lvl5pPr marL="1999468" indent="-222164" defTabSz="921052" eaLnBrk="0" hangingPunct="0">
+              <a:defRPr>
+                <a:solidFill>
+                  <a:schemeClr val="tx1"/>
+                </a:solidFill>
+                <a:latin typeface="Arial" charset="0"/>
+                <a:cs typeface="Arial" charset="0"/>
+              </a:defRPr>
+            </a:lvl5pPr>
+            <a:lvl6pPr marL="2443794" indent="-222164" defTabSz="921052" eaLnBrk="0" fontAlgn="base" hangingPunct="0">
+              <a:spcBef>
+                <a:spcPct val="0"/>
+              </a:spcBef>
+              <a:spcAft>
+                <a:spcPct val="0"/>
+              </a:spcAft>
+              <a:defRPr>
+                <a:solidFill>
+                  <a:schemeClr val="tx1"/>
+                </a:solidFill>
+                <a:latin typeface="Arial" charset="0"/>
+                <a:cs typeface="Arial" charset="0"/>
+              </a:defRPr>
+            </a:lvl6pPr>
+            <a:lvl7pPr marL="2888120" indent="-222164" defTabSz="921052" eaLnBrk="0" fontAlgn="base" hangingPunct="0">
+              <a:spcBef>
+                <a:spcPct val="0"/>
+              </a:spcBef>
+              <a:spcAft>
+                <a:spcPct val="0"/>
+              </a:spcAft>
+              <a:defRPr>
+                <a:solidFill>
+                  <a:schemeClr val="tx1"/>
+                </a:solidFill>
+                <a:latin typeface="Arial" charset="0"/>
+                <a:cs typeface="Arial" charset="0"/>
+              </a:defRPr>
+            </a:lvl7pPr>
+            <a:lvl8pPr marL="3332446" indent="-222164" defTabSz="921052" eaLnBrk="0" fontAlgn="base" hangingPunct="0">
+              <a:spcBef>
+                <a:spcPct val="0"/>
+              </a:spcBef>
+              <a:spcAft>
+                <a:spcPct val="0"/>
+              </a:spcAft>
+              <a:defRPr>
+                <a:solidFill>
+                  <a:schemeClr val="tx1"/>
+                </a:solidFill>
+                <a:latin typeface="Arial" charset="0"/>
+                <a:cs typeface="Arial" charset="0"/>
+              </a:defRPr>
+            </a:lvl8pPr>
+            <a:lvl9pPr marL="3776772" indent="-222164" defTabSz="921052" eaLnBrk="0" fontAlgn="base" hangingPunct="0">
+              <a:spcBef>
+                <a:spcPct val="0"/>
+              </a:spcBef>
+              <a:spcAft>
+                <a:spcPct val="0"/>
+              </a:spcAft>
+              <a:defRPr>
+                <a:solidFill>
+                  <a:schemeClr val="tx1"/>
+                </a:solidFill>
+                <a:latin typeface="Arial" charset="0"/>
+                <a:cs typeface="Arial" charset="0"/>
+              </a:defRPr>
+            </a:lvl9pPr>
+          </a:lstStyle>
+          <a:p>
+            <a:pPr eaLnBrk="1" hangingPunct="1"/>
+            <a:fld id="{E47E67CA-0912-48C1-8CF5-C86F64D6F0FD}" type="slidenum">
+              <a:rPr lang="en-US" smtClean="0">
+                <a:latin typeface="Calibri" pitchFamily="34" charset="0"/>
+              </a:rPr>
+              <a:pPr eaLnBrk="1" hangingPunct="1"/>
+              <a:t>10</a:t>
+            </a:fld>
+            <a:endParaRPr lang="en-US">
+              <a:latin typeface="Calibri" pitchFamily="34" charset="0"/>
+            </a:endParaRPr>
+          </a:p>
+        </p:txBody>
+      </p:sp>
+    </p:spTree>
+    <p:extLst>
+      <p:ext uri="{BB962C8B-B14F-4D97-AF65-F5344CB8AC3E}">
+        <p14:creationId xmlns:p14="http://schemas.microsoft.com/office/powerpoint/2010/main" val="3354114229"/>
+      </p:ext>
+    </p:extLst>
+  </p:cSld>
+  <p:clrMapOvr>
+    <a:masterClrMapping/>
+  </p:clrMapOvr>
+</p:notes>
+</file>
+
+<file path=ppt/notesSlides/notesSlide9.xml><?xml version="1.0" encoding="utf-8"?>
+<p:notes xmlns:a="http://schemas.openxmlformats.org/drawingml/2006/main" xmlns:r="http://schemas.openxmlformats.org/officeDocument/2006/relationships" xmlns:p="http://schemas.openxmlformats.org/presentationml/2006/main">
+  <p:cSld>
+    <p:spTree>
+      <p:nvGrpSpPr>
+        <p:cNvPr id="1" name=""/>
+        <p:cNvGrpSpPr/>
+        <p:nvPr/>
+      </p:nvGrpSpPr>
+      <p:grpSpPr>
+        <a:xfrm>
+          <a:off x="0" y="0"/>
+          <a:ext cx="0" cy="0"/>
+          <a:chOff x="0" y="0"/>
+          <a:chExt cx="0" cy="0"/>
+        </a:xfrm>
+      </p:grpSpPr>
+      <p:sp>
+        <p:nvSpPr>
           <p:cNvPr id="2" name="Slide Image Placeholder 1"/>
           <p:cNvSpPr>
             <a:spLocks noGrp="1" noRot="1" noChangeAspect="1"/>
@@ -2916,7 +3221,7 @@
               <a:pPr>
                 <a:defRPr/>
               </a:pPr>
-              <a:t>8</a:t>
+              <a:t>11</a:t>
             </a:fld>
             <a:endParaRPr lang="en-US"/>
           </a:p>
@@ -3120,7 +3425,7 @@
               <a:pPr>
                 <a:defRPr/>
               </a:pPr>
-              <a:t>Tuesday, November 21, 2023</a:t>
+              <a:t>Monday, January 15, 2024</a:t>
             </a:fld>
             <a:endParaRPr lang="en-US"/>
           </a:p>
@@ -3303,7 +3608,7 @@
               <a:pPr>
                 <a:defRPr/>
               </a:pPr>
-              <a:t>Tuesday, November 21, 2023</a:t>
+              <a:t>Monday, January 15, 2024</a:t>
             </a:fld>
             <a:endParaRPr lang="en-US"/>
           </a:p>
@@ -3496,7 +3801,7 @@
               <a:pPr>
                 <a:defRPr/>
               </a:pPr>
-              <a:t>Tuesday, November 21, 2023</a:t>
+              <a:t>Monday, January 15, 2024</a:t>
             </a:fld>
             <a:endParaRPr lang="en-US"/>
           </a:p>
@@ -3679,7 +3984,7 @@
               <a:pPr>
                 <a:defRPr/>
               </a:pPr>
-              <a:t>Tuesday, November 21, 2023</a:t>
+              <a:t>Monday, January 15, 2024</a:t>
             </a:fld>
             <a:endParaRPr lang="en-US"/>
           </a:p>
@@ -3939,7 +4244,7 @@
               <a:pPr>
                 <a:defRPr/>
               </a:pPr>
-              <a:t>Tuesday, November 21, 2023</a:t>
+              <a:t>Monday, January 15, 2024</a:t>
             </a:fld>
             <a:endParaRPr lang="en-US"/>
           </a:p>
@@ -4239,7 +4544,7 @@
               <a:pPr>
                 <a:defRPr/>
               </a:pPr>
-              <a:t>Tuesday, November 21, 2023</a:t>
+              <a:t>Monday, January 15, 2024</a:t>
             </a:fld>
             <a:endParaRPr lang="en-US"/>
           </a:p>
@@ -4673,7 +4978,7 @@
               <a:pPr>
                 <a:defRPr/>
               </a:pPr>
-              <a:t>Tuesday, November 21, 2023</a:t>
+              <a:t>Monday, January 15, 2024</a:t>
             </a:fld>
             <a:endParaRPr lang="en-US"/>
           </a:p>
@@ -4805,7 +5110,7 @@
               <a:pPr>
                 <a:defRPr/>
               </a:pPr>
-              <a:t>Tuesday, November 21, 2023</a:t>
+              <a:t>Monday, January 15, 2024</a:t>
             </a:fld>
             <a:endParaRPr lang="en-US"/>
           </a:p>
@@ -4915,7 +5220,7 @@
               <a:pPr>
                 <a:defRPr/>
               </a:pPr>
-              <a:t>Tuesday, November 21, 2023</a:t>
+              <a:t>Monday, January 15, 2024</a:t>
             </a:fld>
             <a:endParaRPr lang="en-US"/>
           </a:p>
@@ -5205,7 +5510,7 @@
               <a:pPr>
                 <a:defRPr/>
               </a:pPr>
-              <a:t>Tuesday, November 21, 2023</a:t>
+              <a:t>Monday, January 15, 2024</a:t>
             </a:fld>
             <a:endParaRPr lang="en-US"/>
           </a:p>
@@ -5472,7 +5777,7 @@
               <a:pPr>
                 <a:defRPr/>
               </a:pPr>
-              <a:t>Tuesday, November 21, 2023</a:t>
+              <a:t>Monday, January 15, 2024</a:t>
             </a:fld>
             <a:endParaRPr lang="en-US"/>
           </a:p>
@@ -5698,7 +6003,7 @@
               <a:pPr>
                 <a:defRPr/>
               </a:pPr>
-              <a:t>Tuesday, November 21, 2023</a:t>
+              <a:t>Monday, January 15, 2024</a:t>
             </a:fld>
             <a:endParaRPr lang="en-US"/>
           </a:p>
@@ -6255,7 +6560,7 @@
             </a:pPr>
             <a:r>
               <a:rPr lang="en-US" sz="2400" i="1" dirty="0" err="1"/>
-              <a:t>PracticeRecursion</a:t>
+              <a:t>PracticeRecursionInClass</a:t>
             </a:r>
             <a:endParaRPr lang="en-US" sz="2400" i="1" dirty="0"/>
           </a:p>
@@ -6266,7 +6571,7 @@
             </a:pPr>
             <a:r>
               <a:rPr lang="en-US" sz="2400" i="1" dirty="0" err="1"/>
-              <a:t>PracticeRecursionSolution</a:t>
+              <a:t>PracticeSolutionRecursionInClass</a:t>
             </a:r>
             <a:endParaRPr lang="en-US" sz="2400" i="1" dirty="0"/>
           </a:p>
@@ -6324,7 +6629,7 @@
         <p:spPr>
           <a:xfrm>
             <a:off x="5647764" y="169108"/>
-            <a:ext cx="3947273" cy="1046440"/>
+            <a:ext cx="3947273" cy="923330"/>
           </a:xfrm>
           <a:prstGeom prst="rect">
             <a:avLst/>
@@ -6365,13 +6670,18 @@
           </a:p>
           <a:p>
             <a:r>
-              <a:rPr lang="en-US" sz="4400" dirty="0">
+              <a:rPr lang="en-US" sz="3600" dirty="0">
                 <a:highlight>
                   <a:srgbClr val="FFFF00"/>
                 </a:highlight>
               </a:rPr>
-              <a:t>__________</a:t>
-            </a:r>
+              <a:t>____________</a:t>
+            </a:r>
+            <a:endParaRPr lang="en-US" sz="4400" dirty="0">
+              <a:highlight>
+                <a:srgbClr val="FFFF00"/>
+              </a:highlight>
+            </a:endParaRPr>
           </a:p>
         </p:txBody>
       </p:sp>
@@ -6399,6 +6709,42 @@
           <a:xfrm>
             <a:off x="6213087" y="1328037"/>
             <a:ext cx="2816626" cy="2439173"/>
+          </a:xfrm>
+          <a:prstGeom prst="rect">
+            <a:avLst/>
+          </a:prstGeom>
+        </p:spPr>
+      </p:pic>
+      <p:pic>
+        <p:nvPicPr>
+          <p:cNvPr id="7" name="Picture 6" descr="A blue triangle with black background&#10;&#10;Description automatically generated">
+            <a:extLst>
+              <a:ext uri="{FF2B5EF4-FFF2-40B4-BE49-F238E27FC236}">
+                <a16:creationId xmlns:a16="http://schemas.microsoft.com/office/drawing/2014/main" id="{60A65862-D70C-FDA5-3DF7-08E49E26A510}"/>
+              </a:ext>
+            </a:extLst>
+          </p:cNvPr>
+          <p:cNvPicPr>
+            <a:picLocks noChangeAspect="1"/>
+          </p:cNvPicPr>
+          <p:nvPr/>
+        </p:nvPicPr>
+        <p:blipFill>
+          <a:blip r:embed="rId5">
+            <a:extLst>
+              <a:ext uri="{28A0092B-C50C-407E-A947-70E740481C1C}">
+                <a14:useLocalDpi xmlns:a14="http://schemas.microsoft.com/office/drawing/2010/main" val="0"/>
+              </a:ext>
+            </a:extLst>
+          </a:blip>
+          <a:stretch>
+            <a:fillRect/>
+          </a:stretch>
+        </p:blipFill>
+        <p:spPr>
+          <a:xfrm>
+            <a:off x="3419474" y="209270"/>
+            <a:ext cx="2141259" cy="2151965"/>
           </a:xfrm>
           <a:prstGeom prst="rect">
             <a:avLst/>
@@ -6432,13 +6778,7 @@
       </p:grpSpPr>
       <p:sp>
         <p:nvSpPr>
-          <p:cNvPr id="2" name="Title 1">
-            <a:extLst>
-              <a:ext uri="{FF2B5EF4-FFF2-40B4-BE49-F238E27FC236}">
-                <a16:creationId xmlns:a16="http://schemas.microsoft.com/office/drawing/2014/main" id="{87143D87-872F-42F5-B2F1-D75E769B72B4}"/>
-              </a:ext>
-            </a:extLst>
-          </p:cNvPr>
+          <p:cNvPr id="3" name="Title 2"/>
           <p:cNvSpPr>
             <a:spLocks noGrp="1"/>
           </p:cNvSpPr>
@@ -6451,99 +6791,339 @@
           <a:bodyPr/>
           <a:lstStyle/>
           <a:p>
-            <a:r>
-              <a:rPr lang="en-US" dirty="0" err="1"/>
-              <a:t>bunnyEars</a:t>
-            </a:r>
-            <a:endParaRPr lang="en-US" dirty="0"/>
-          </a:p>
-        </p:txBody>
-      </p:sp>
-      <p:sp>
-        <p:nvSpPr>
-          <p:cNvPr id="5" name="TextBox 4">
-            <a:extLst>
-              <a:ext uri="{FF2B5EF4-FFF2-40B4-BE49-F238E27FC236}">
-                <a16:creationId xmlns:a16="http://schemas.microsoft.com/office/drawing/2014/main" id="{846D74BE-A868-E630-5592-C8B4B8637905}"/>
-              </a:ext>
-            </a:extLst>
-          </p:cNvPr>
-          <p:cNvSpPr txBox="1"/>
-          <p:nvPr/>
+            <a:pPr>
+              <a:defRPr/>
+            </a:pPr>
+            <a:r>
+              <a:rPr lang="en-US"/>
+              <a:t>Programming Problem</a:t>
+            </a:r>
+          </a:p>
+        </p:txBody>
+      </p:sp>
+      <p:sp>
+        <p:nvSpPr>
+          <p:cNvPr id="15362" name="Content Placeholder 1"/>
+          <p:cNvSpPr>
+            <a:spLocks noGrp="1"/>
+          </p:cNvSpPr>
+          <p:nvPr>
+            <p:ph idx="1"/>
+          </p:nvPr>
         </p:nvSpPr>
         <p:spPr>
           <a:xfrm>
-            <a:off x="381000" y="2274838"/>
-            <a:ext cx="7772400" cy="3046988"/>
+            <a:off x="457200" y="1481138"/>
+            <a:ext cx="8229600" cy="4525962"/>
           </a:xfrm>
-          <a:prstGeom prst="rect">
-            <a:avLst/>
-          </a:prstGeom>
-          <a:noFill/>
         </p:spPr>
         <p:txBody>
-          <a:bodyPr wrap="square">
-            <a:spAutoFit/>
+          <a:bodyPr>
+            <a:normAutofit/>
           </a:bodyPr>
           <a:lstStyle/>
           <a:p>
-            <a:r>
-              <a:rPr lang="en-US" sz="3200" dirty="0"/>
-              <a:t>public int </a:t>
-            </a:r>
-            <a:r>
-              <a:rPr lang="en-US" sz="3200" dirty="0" err="1"/>
-              <a:t>bunnyEars</a:t>
-            </a:r>
-            <a:r>
-              <a:rPr lang="en-US" sz="3200" dirty="0"/>
-              <a:t>(int bunnies) {</a:t>
-            </a:r>
-          </a:p>
-          <a:p>
-            <a:r>
-              <a:rPr lang="en-US" sz="3200" dirty="0"/>
-              <a:t>  if (bunnies == 0) {</a:t>
-            </a:r>
-          </a:p>
-          <a:p>
-            <a:r>
-              <a:rPr lang="en-US" sz="3200" dirty="0"/>
-              <a:t>    return 0;</a:t>
-            </a:r>
-          </a:p>
-          <a:p>
-            <a:r>
-              <a:rPr lang="en-US" sz="3200" dirty="0"/>
-              <a:t>  }</a:t>
-            </a:r>
-          </a:p>
-          <a:p>
-            <a:r>
-              <a:rPr lang="en-US" sz="3200" dirty="0"/>
-              <a:t>  return 2 + </a:t>
-            </a:r>
-            <a:r>
-              <a:rPr lang="en-US" sz="3200" dirty="0" err="1"/>
-              <a:t>bunnyEars</a:t>
-            </a:r>
-            <a:r>
-              <a:rPr lang="en-US" sz="3200" dirty="0"/>
-              <a:t>(bunnies-1);</a:t>
-            </a:r>
-          </a:p>
-          <a:p>
-            <a:r>
-              <a:rPr lang="en-US" sz="3200" dirty="0"/>
+            <a:pPr marL="0" indent="0">
+              <a:buNone/>
+            </a:pPr>
+            <a:r>
+              <a:rPr lang="en-US"/>
+              <a:t>Add a recursive method called </a:t>
+            </a:r>
+            <a:r>
+              <a:rPr lang="en-US" i="1" err="1"/>
+              <a:t>isPalindrome</a:t>
+            </a:r>
+            <a:r>
+              <a:rPr lang="en-US"/>
+              <a:t> to Sentence for computing whether Sentence is a palindrome</a:t>
+            </a:r>
+          </a:p>
+          <a:p>
+            <a:pPr marL="0" indent="0">
+              <a:buNone/>
+            </a:pPr>
+            <a:r>
+              <a:rPr lang="en-US" sz="2200">
+                <a:latin typeface="Courier New" panose="02070309020205020404" pitchFamily="49" charset="0"/>
+                <a:cs typeface="Courier New" panose="02070309020205020404" pitchFamily="49" charset="0"/>
+              </a:rPr>
+              <a:t>{</a:t>
+            </a:r>
+          </a:p>
+          <a:p>
+            <a:pPr marL="0" indent="0">
+              <a:buNone/>
+            </a:pPr>
+            <a:r>
+              <a:rPr lang="en-US" sz="2200">
+                <a:latin typeface="Courier New" panose="02070309020205020404" pitchFamily="49" charset="0"/>
+                <a:cs typeface="Courier New" panose="02070309020205020404" pitchFamily="49" charset="0"/>
+              </a:rPr>
+              <a:t>   Sentence s1 = </a:t>
+            </a:r>
+          </a:p>
+          <a:p>
+            <a:pPr marL="0" indent="0">
+              <a:buNone/>
+            </a:pPr>
+            <a:r>
+              <a:rPr lang="en-US" sz="2200">
+                <a:latin typeface="Courier New" panose="02070309020205020404" pitchFamily="49" charset="0"/>
+                <a:cs typeface="Courier New" panose="02070309020205020404" pitchFamily="49" charset="0"/>
+              </a:rPr>
+              <a:t>	new Sentence("A nut for a jar of tuna");</a:t>
+            </a:r>
+          </a:p>
+          <a:p>
+            <a:pPr marL="0" indent="0">
+              <a:buNone/>
+            </a:pPr>
+            <a:r>
+              <a:rPr lang="en-US" sz="2200">
+                <a:latin typeface="Courier New" panose="02070309020205020404" pitchFamily="49" charset="0"/>
+                <a:cs typeface="Courier New" panose="02070309020205020404" pitchFamily="49" charset="0"/>
+              </a:rPr>
+              <a:t>   </a:t>
+            </a:r>
+            <a:r>
+              <a:rPr lang="en-US" sz="2200" err="1">
+                <a:latin typeface="Courier New" panose="02070309020205020404" pitchFamily="49" charset="0"/>
+                <a:cs typeface="Courier New" panose="02070309020205020404" pitchFamily="49" charset="0"/>
+              </a:rPr>
+              <a:t>System.out.print</a:t>
+            </a:r>
+            <a:r>
+              <a:rPr lang="en-US" sz="2200">
+                <a:latin typeface="Courier New" panose="02070309020205020404" pitchFamily="49" charset="0"/>
+                <a:cs typeface="Courier New" panose="02070309020205020404" pitchFamily="49" charset="0"/>
+              </a:rPr>
+              <a:t>(s1.isPalindrome());</a:t>
+            </a:r>
+          </a:p>
+          <a:p>
+            <a:pPr marL="0" indent="0">
+              <a:buNone/>
+            </a:pPr>
+            <a:r>
+              <a:rPr lang="en-US" sz="2200">
+                <a:latin typeface="Courier New" panose="02070309020205020404" pitchFamily="49" charset="0"/>
+                <a:cs typeface="Courier New" panose="02070309020205020404" pitchFamily="49" charset="0"/>
+              </a:rPr>
               <a:t>}</a:t>
             </a:r>
           </a:p>
         </p:txBody>
       </p:sp>
+      <p:grpSp>
+        <p:nvGrpSpPr>
+          <p:cNvPr id="15364" name="Group 6"/>
+          <p:cNvGrpSpPr>
+            <a:grpSpLocks/>
+          </p:cNvGrpSpPr>
+          <p:nvPr/>
+        </p:nvGrpSpPr>
+        <p:grpSpPr bwMode="auto">
+          <a:xfrm>
+            <a:off x="5029200" y="4648200"/>
+            <a:ext cx="3581400" cy="1754921"/>
+            <a:chOff x="5334000" y="2505670"/>
+            <a:chExt cx="3581400" cy="1754578"/>
+          </a:xfrm>
+        </p:grpSpPr>
+        <p:sp>
+          <p:nvSpPr>
+            <p:cNvPr id="4" name="TextBox 3"/>
+            <p:cNvSpPr txBox="1"/>
+            <p:nvPr/>
+          </p:nvSpPr>
+          <p:spPr>
+            <a:xfrm>
+              <a:off x="5334000" y="2505670"/>
+              <a:ext cx="3581400" cy="512662"/>
+            </a:xfrm>
+            <a:prstGeom prst="rect">
+              <a:avLst/>
+            </a:prstGeom>
+          </p:spPr>
+          <p:style>
+            <a:lnRef idx="2">
+              <a:schemeClr val="accent1">
+                <a:shade val="50000"/>
+              </a:schemeClr>
+            </a:lnRef>
+            <a:fillRef idx="1">
+              <a:schemeClr val="accent1"/>
+            </a:fillRef>
+            <a:effectRef idx="0">
+              <a:schemeClr val="accent1"/>
+            </a:effectRef>
+            <a:fontRef idx="minor">
+              <a:schemeClr val="lt1"/>
+            </a:fontRef>
+          </p:style>
+          <p:txBody>
+            <a:bodyPr>
+              <a:spAutoFit/>
+            </a:bodyPr>
+            <a:lstStyle/>
+            <a:p>
+              <a:pPr algn="ctr">
+                <a:defRPr/>
+              </a:pPr>
+              <a:r>
+                <a:rPr lang="en-US" sz="2400">
+                  <a:cs typeface="Lucida Sans Unicode" pitchFamily="34" charset="0"/>
+                </a:rPr>
+                <a:t>Sentence</a:t>
+              </a:r>
+            </a:p>
+          </p:txBody>
+        </p:sp>
+        <p:sp>
+          <p:nvSpPr>
+            <p:cNvPr id="5" name="TextBox 4"/>
+            <p:cNvSpPr txBox="1"/>
+            <p:nvPr/>
+          </p:nvSpPr>
+          <p:spPr>
+            <a:xfrm>
+              <a:off x="5334000" y="2967542"/>
+              <a:ext cx="3581400" cy="512663"/>
+            </a:xfrm>
+            <a:prstGeom prst="rect">
+              <a:avLst/>
+            </a:prstGeom>
+          </p:spPr>
+          <p:style>
+            <a:lnRef idx="2">
+              <a:schemeClr val="accent1">
+                <a:shade val="50000"/>
+              </a:schemeClr>
+            </a:lnRef>
+            <a:fillRef idx="1">
+              <a:schemeClr val="accent1"/>
+            </a:fillRef>
+            <a:effectRef idx="0">
+              <a:schemeClr val="accent1"/>
+            </a:effectRef>
+            <a:fontRef idx="minor">
+              <a:schemeClr val="lt1"/>
+            </a:fontRef>
+          </p:style>
+          <p:txBody>
+            <a:bodyPr>
+              <a:spAutoFit/>
+            </a:bodyPr>
+            <a:lstStyle/>
+            <a:p>
+              <a:pPr>
+                <a:defRPr/>
+              </a:pPr>
+              <a:r>
+                <a:rPr lang="en-US" sz="2400">
+                  <a:cs typeface="Lucida Sans Unicode" pitchFamily="34" charset="0"/>
+                </a:rPr>
+                <a:t>String text</a:t>
+              </a:r>
+            </a:p>
+          </p:txBody>
+        </p:sp>
+        <p:sp>
+          <p:nvSpPr>
+            <p:cNvPr id="6" name="TextBox 5"/>
+            <p:cNvSpPr txBox="1"/>
+            <p:nvPr/>
+          </p:nvSpPr>
+          <p:spPr>
+            <a:xfrm>
+              <a:off x="5334000" y="3429414"/>
+              <a:ext cx="3581400" cy="830834"/>
+            </a:xfrm>
+            <a:prstGeom prst="rect">
+              <a:avLst/>
+            </a:prstGeom>
+          </p:spPr>
+          <p:style>
+            <a:lnRef idx="2">
+              <a:schemeClr val="accent1">
+                <a:shade val="50000"/>
+              </a:schemeClr>
+            </a:lnRef>
+            <a:fillRef idx="1">
+              <a:schemeClr val="accent1"/>
+            </a:fillRef>
+            <a:effectRef idx="0">
+              <a:schemeClr val="accent1"/>
+            </a:effectRef>
+            <a:fontRef idx="minor">
+              <a:schemeClr val="lt1"/>
+            </a:fontRef>
+          </p:style>
+          <p:txBody>
+            <a:bodyPr>
+              <a:spAutoFit/>
+            </a:bodyPr>
+            <a:lstStyle/>
+            <a:p>
+              <a:pPr>
+                <a:defRPr/>
+              </a:pPr>
+              <a:r>
+                <a:rPr lang="en-US" sz="2400">
+                  <a:cs typeface="Lucida Sans Unicode" pitchFamily="34" charset="0"/>
+                </a:rPr>
+                <a:t>String </a:t>
+              </a:r>
+              <a:r>
+                <a:rPr lang="en-US" sz="2400" err="1">
+                  <a:cs typeface="Lucida Sans Unicode" pitchFamily="34" charset="0"/>
+                </a:rPr>
+                <a:t>toString</a:t>
+              </a:r>
+              <a:r>
+                <a:rPr lang="en-US" sz="2400">
+                  <a:cs typeface="Lucida Sans Unicode" pitchFamily="34" charset="0"/>
+                </a:rPr>
+                <a:t>()</a:t>
+              </a:r>
+            </a:p>
+            <a:p>
+              <a:pPr>
+                <a:defRPr/>
+              </a:pPr>
+              <a:r>
+                <a:rPr lang="en-US" sz="2400" err="1">
+                  <a:cs typeface="Lucida Sans Unicode" pitchFamily="34" charset="0"/>
+                </a:rPr>
+                <a:t>boolean</a:t>
+              </a:r>
+              <a:r>
+                <a:rPr lang="en-US" sz="2400">
+                  <a:cs typeface="Lucida Sans Unicode" pitchFamily="34" charset="0"/>
+                </a:rPr>
+                <a:t> </a:t>
+              </a:r>
+              <a:r>
+                <a:rPr lang="en-US" sz="2400" err="1">
+                  <a:cs typeface="Lucida Sans Unicode" pitchFamily="34" charset="0"/>
+                </a:rPr>
+                <a:t>isPalindrome</a:t>
+              </a:r>
+              <a:r>
+                <a:rPr lang="en-US" sz="2400">
+                  <a:cs typeface="Lucida Sans Unicode" pitchFamily="34" charset="0"/>
+                </a:rPr>
+                <a:t>()</a:t>
+              </a:r>
+            </a:p>
+          </p:txBody>
+        </p:sp>
+      </p:grpSp>
     </p:spTree>
     <p:extLst>
       <p:ext uri="{BB962C8B-B14F-4D97-AF65-F5344CB8AC3E}">
-        <p14:creationId xmlns:p14="http://schemas.microsoft.com/office/powerpoint/2010/main" val="456599958"/>
+        <p14:creationId xmlns:p14="http://schemas.microsoft.com/office/powerpoint/2010/main" val="858932081"/>
       </p:ext>
     </p:extLst>
   </p:cSld>
@@ -6554,7 +7134,7 @@
 </file>
 
 <file path=ppt/slides/slide11.xml><?xml version="1.0" encoding="utf-8"?>
-<p:sld xmlns:a="http://schemas.openxmlformats.org/drawingml/2006/main" xmlns:r="http://schemas.openxmlformats.org/officeDocument/2006/relationships" xmlns:p="http://schemas.openxmlformats.org/presentationml/2006/main" show="0">
+<p:sld xmlns:a="http://schemas.openxmlformats.org/drawingml/2006/main" xmlns:r="http://schemas.openxmlformats.org/officeDocument/2006/relationships" xmlns:p="http://schemas.openxmlformats.org/presentationml/2006/main">
   <p:cSld>
     <p:spTree>
       <p:nvGrpSpPr>
@@ -6572,13 +7152,7 @@
       </p:grpSpPr>
       <p:sp>
         <p:nvSpPr>
-          <p:cNvPr id="2" name="Title 1">
-            <a:extLst>
-              <a:ext uri="{FF2B5EF4-FFF2-40B4-BE49-F238E27FC236}">
-                <a16:creationId xmlns:a16="http://schemas.microsoft.com/office/drawing/2014/main" id="{1656ABEE-5571-3224-B213-549F079EC357}"/>
-              </a:ext>
-            </a:extLst>
-          </p:cNvPr>
+          <p:cNvPr id="3" name="Title 2"/>
           <p:cNvSpPr>
             <a:spLocks noGrp="1"/>
           </p:cNvSpPr>
@@ -6592,91 +7166,86 @@
           <a:lstStyle/>
           <a:p>
             <a:r>
-              <a:rPr lang="en-US" dirty="0"/>
-              <a:t>bunnyEars2</a:t>
-            </a:r>
-          </a:p>
-        </p:txBody>
-      </p:sp>
-      <p:sp>
-        <p:nvSpPr>
-          <p:cNvPr id="5" name="TextBox 4">
-            <a:extLst>
-              <a:ext uri="{FF2B5EF4-FFF2-40B4-BE49-F238E27FC236}">
-                <a16:creationId xmlns:a16="http://schemas.microsoft.com/office/drawing/2014/main" id="{DC4304E0-EE07-8653-E255-92DB9F308450}"/>
-              </a:ext>
-            </a:extLst>
-          </p:cNvPr>
-          <p:cNvSpPr txBox="1"/>
-          <p:nvPr/>
-        </p:nvSpPr>
-        <p:spPr>
-          <a:xfrm>
-            <a:off x="457200" y="1859340"/>
-            <a:ext cx="8229600" cy="4524315"/>
-          </a:xfrm>
-          <a:prstGeom prst="rect">
-            <a:avLst/>
-          </a:prstGeom>
-          <a:noFill/>
-        </p:spPr>
-        <p:txBody>
-          <a:bodyPr wrap="square">
-            <a:spAutoFit/>
-          </a:bodyPr>
+              <a:rPr lang="en-US"/>
+              <a:t>Practice </a:t>
+            </a:r>
+            <a:r>
+              <a:rPr lang="en-US" err="1"/>
+              <a:t>Practice</a:t>
+            </a:r>
+            <a:r>
+              <a:rPr lang="en-US"/>
+              <a:t> </a:t>
+            </a:r>
+            <a:r>
+              <a:rPr lang="en-US" err="1"/>
+              <a:t>Practice</a:t>
+            </a:r>
+            <a:endParaRPr lang="en-US"/>
+          </a:p>
+        </p:txBody>
+      </p:sp>
+      <p:sp>
+        <p:nvSpPr>
+          <p:cNvPr id="2" name="Content Placeholder 1"/>
+          <p:cNvSpPr>
+            <a:spLocks noGrp="1"/>
+          </p:cNvSpPr>
+          <p:nvPr>
+            <p:ph idx="1"/>
+          </p:nvPr>
+        </p:nvSpPr>
+        <p:spPr/>
+        <p:txBody>
+          <a:bodyPr/>
           <a:lstStyle/>
           <a:p>
             <a:r>
-              <a:rPr lang="en-US" sz="3200" dirty="0"/>
-              <a:t>public int bunnyEars2(int bunnies) {</a:t>
-            </a:r>
-          </a:p>
-          <a:p>
-            <a:r>
-              <a:rPr lang="en-US" sz="3200" dirty="0"/>
-              <a:t>  if (bunnies==0) {</a:t>
-            </a:r>
-          </a:p>
-          <a:p>
-            <a:r>
-              <a:rPr lang="en-US" sz="3200" dirty="0"/>
-              <a:t>    return 0;</a:t>
-            </a:r>
-          </a:p>
-          <a:p>
-            <a:r>
-              <a:rPr lang="en-US" sz="3200" dirty="0"/>
-              <a:t>  }</a:t>
-            </a:r>
-          </a:p>
-          <a:p>
-            <a:r>
-              <a:rPr lang="en-US" sz="3200" dirty="0"/>
-              <a:t>  if (bunnies%2==0){</a:t>
-            </a:r>
-          </a:p>
-          <a:p>
-            <a:r>
-              <a:rPr lang="en-US" sz="3200" dirty="0"/>
-              <a:t>    return 3 + bunnyEars2(bunnies-1);</a:t>
-            </a:r>
-          </a:p>
-          <a:p>
-            <a:r>
-              <a:rPr lang="en-US" sz="3200" dirty="0"/>
-              <a:t>  }</a:t>
-            </a:r>
-          </a:p>
-          <a:p>
-            <a:r>
-              <a:rPr lang="en-US" sz="3200" dirty="0"/>
-              <a:t>  return 2 + bunnyEars2(bunnies-1);</a:t>
-            </a:r>
-          </a:p>
-          <a:p>
-            <a:r>
-              <a:rPr lang="en-US" sz="3200" dirty="0"/>
-              <a:t>}</a:t>
+              <a:rPr lang="en-US"/>
+              <a:t>Head to </a:t>
+            </a:r>
+            <a:r>
+              <a:rPr lang="en-US">
+                <a:hlinkClick r:id="rId3"/>
+              </a:rPr>
+              <a:t>http://codingbat.com/java/Recursion-1</a:t>
+            </a:r>
+            <a:r>
+              <a:rPr lang="en-US"/>
+              <a:t> and solve 5 problems.  I personally like </a:t>
+            </a:r>
+            <a:r>
+              <a:rPr lang="en-US" err="1"/>
+              <a:t>bunnyEars</a:t>
+            </a:r>
+            <a:r>
+              <a:rPr lang="en-US"/>
+              <a:t>, bunnyEars2, count7, </a:t>
+            </a:r>
+            <a:r>
+              <a:rPr lang="en-US" err="1"/>
+              <a:t>fibonacci</a:t>
+            </a:r>
+            <a:r>
+              <a:rPr lang="en-US"/>
+              <a:t>, and </a:t>
+            </a:r>
+            <a:r>
+              <a:rPr lang="en-US" err="1"/>
+              <a:t>noX</a:t>
+            </a:r>
+            <a:endParaRPr lang="en-US"/>
+          </a:p>
+          <a:p>
+            <a:r>
+              <a:rPr lang="en-US"/>
+              <a:t>Get help from me if you get stuck</a:t>
+            </a:r>
+          </a:p>
+          <a:p>
+            <a:r>
+              <a:rPr lang="en-US"/>
+              <a:t>Then take a look at the recursion homework</a:t>
             </a:r>
           </a:p>
         </p:txBody>
@@ -6684,7 +7253,7 @@
     </p:spTree>
     <p:extLst>
       <p:ext uri="{BB962C8B-B14F-4D97-AF65-F5344CB8AC3E}">
-        <p14:creationId xmlns:p14="http://schemas.microsoft.com/office/powerpoint/2010/main" val="1758280130"/>
+        <p14:creationId xmlns:p14="http://schemas.microsoft.com/office/powerpoint/2010/main" val="375092834"/>
       </p:ext>
     </p:extLst>
   </p:cSld>
@@ -6695,7 +7264,7 @@
 </file>
 
 <file path=ppt/slides/slide12.xml><?xml version="1.0" encoding="utf-8"?>
-<p:sld xmlns:a="http://schemas.openxmlformats.org/drawingml/2006/main" xmlns:r="http://schemas.openxmlformats.org/officeDocument/2006/relationships" xmlns:p="http://schemas.openxmlformats.org/presentationml/2006/main" show="0">
+<p:sld xmlns:a="http://schemas.openxmlformats.org/drawingml/2006/main" xmlns:r="http://schemas.openxmlformats.org/officeDocument/2006/relationships" xmlns:p="http://schemas.openxmlformats.org/presentationml/2006/main">
   <p:cSld>
     <p:spTree>
       <p:nvGrpSpPr>
@@ -6716,7 +7285,7 @@
           <p:cNvPr id="2" name="Title 1">
             <a:extLst>
               <a:ext uri="{FF2B5EF4-FFF2-40B4-BE49-F238E27FC236}">
-                <a16:creationId xmlns:a16="http://schemas.microsoft.com/office/drawing/2014/main" id="{BEC9C5B3-78B1-C001-B52A-0B0B8645FB14}"/>
+                <a16:creationId xmlns:a16="http://schemas.microsoft.com/office/drawing/2014/main" id="{31137CE5-564D-865C-64C2-E3000DB491C1}"/>
               </a:ext>
             </a:extLst>
           </p:cNvPr>
@@ -6734,90 +7303,54 @@
           <a:p>
             <a:r>
               <a:rPr lang="en-US" dirty="0"/>
-              <a:t>Count 7</a:t>
-            </a:r>
-          </a:p>
-        </p:txBody>
-      </p:sp>
-      <p:sp>
-        <p:nvSpPr>
-          <p:cNvPr id="5" name="TextBox 4">
+              <a:t>Solutions</a:t>
+            </a:r>
+          </a:p>
+        </p:txBody>
+      </p:sp>
+      <p:sp>
+        <p:nvSpPr>
+          <p:cNvPr id="3" name="Content Placeholder 2">
             <a:extLst>
               <a:ext uri="{FF2B5EF4-FFF2-40B4-BE49-F238E27FC236}">
-                <a16:creationId xmlns:a16="http://schemas.microsoft.com/office/drawing/2014/main" id="{EDB83B16-A927-E42E-0777-63EC1525014C}"/>
+                <a16:creationId xmlns:a16="http://schemas.microsoft.com/office/drawing/2014/main" id="{C31F3CF6-EF17-6536-E2F4-A1B9324C5815}"/>
               </a:ext>
             </a:extLst>
           </p:cNvPr>
-          <p:cNvSpPr txBox="1"/>
-          <p:nvPr/>
-        </p:nvSpPr>
-        <p:spPr>
-          <a:xfrm>
-            <a:off x="685800" y="1859340"/>
-            <a:ext cx="7620000" cy="4524315"/>
-          </a:xfrm>
-          <a:prstGeom prst="rect">
-            <a:avLst/>
-          </a:prstGeom>
-          <a:noFill/>
-        </p:spPr>
-        <p:txBody>
-          <a:bodyPr wrap="square">
-            <a:spAutoFit/>
-          </a:bodyPr>
+          <p:cNvSpPr>
+            <a:spLocks noGrp="1"/>
+          </p:cNvSpPr>
+          <p:nvPr>
+            <p:ph idx="1"/>
+          </p:nvPr>
+        </p:nvSpPr>
+        <p:spPr/>
+        <p:txBody>
+          <a:bodyPr/>
           <a:lstStyle/>
           <a:p>
             <a:r>
-              <a:rPr lang="en-US" sz="3200" dirty="0"/>
-              <a:t>public int count7(int n) {</a:t>
-            </a:r>
-          </a:p>
-          <a:p>
-            <a:r>
-              <a:rPr lang="en-US" sz="3200" dirty="0"/>
-              <a:t>  if (n==0) {</a:t>
-            </a:r>
-          </a:p>
-          <a:p>
-            <a:r>
-              <a:rPr lang="en-US" sz="3200" dirty="0"/>
-              <a:t>    return 0;</a:t>
-            </a:r>
-          </a:p>
-          <a:p>
-            <a:r>
-              <a:rPr lang="en-US" sz="3200" dirty="0"/>
-              <a:t>  }</a:t>
-            </a:r>
-          </a:p>
-          <a:p>
-            <a:r>
-              <a:rPr lang="en-US" sz="3200" dirty="0"/>
-              <a:t>  if (n%10 == 7) {</a:t>
-            </a:r>
-          </a:p>
-          <a:p>
-            <a:r>
-              <a:rPr lang="en-US" sz="3200" dirty="0"/>
-              <a:t>    return 1 + count7(n/10);</a:t>
-            </a:r>
-          </a:p>
-          <a:p>
-            <a:r>
-              <a:rPr lang="en-US" sz="3200" dirty="0"/>
-              <a:t>  }</a:t>
-            </a:r>
-          </a:p>
-          <a:p>
-            <a:r>
-              <a:rPr lang="en-US" sz="3200" dirty="0"/>
-              <a:t>  return count7(n/10);</a:t>
-            </a:r>
-          </a:p>
-          <a:p>
-            <a:r>
-              <a:rPr lang="en-US" sz="3200" dirty="0"/>
-              <a:t>}</a:t>
+              <a:rPr lang="en-US" dirty="0">
+                <a:solidFill>
+                  <a:schemeClr val="bg1"/>
+                </a:solidFill>
+                <a:highlight>
+                  <a:srgbClr val="FF0000"/>
+                </a:highlight>
+              </a:rPr>
+              <a:t>LOOKING AT THESE BEFORE ATTEMPTING THEM WILL NOT BE LIKELY TO HELP YOU</a:t>
+            </a:r>
+          </a:p>
+          <a:p>
+            <a:r>
+              <a:rPr lang="en-US" dirty="0"/>
+              <a:t>It is OK to look if you have completed them</a:t>
+            </a:r>
+          </a:p>
+          <a:p>
+            <a:r>
+              <a:rPr lang="en-US" dirty="0"/>
+              <a:t>It is OK to look at only one if you have spent a significant time (10+ minutes) and feel stuck</a:t>
             </a:r>
           </a:p>
         </p:txBody>
@@ -6825,7 +7358,7 @@
     </p:spTree>
     <p:extLst>
       <p:ext uri="{BB962C8B-B14F-4D97-AF65-F5344CB8AC3E}">
-        <p14:creationId xmlns:p14="http://schemas.microsoft.com/office/powerpoint/2010/main" val="3394342281"/>
+        <p14:creationId xmlns:p14="http://schemas.microsoft.com/office/powerpoint/2010/main" val="3934717956"/>
       </p:ext>
     </p:extLst>
   </p:cSld>
@@ -6857,7 +7390,7 @@
           <p:cNvPr id="2" name="Title 1">
             <a:extLst>
               <a:ext uri="{FF2B5EF4-FFF2-40B4-BE49-F238E27FC236}">
-                <a16:creationId xmlns:a16="http://schemas.microsoft.com/office/drawing/2014/main" id="{3E745C04-70D1-EBE0-4E01-F2C1FF9615D7}"/>
+                <a16:creationId xmlns:a16="http://schemas.microsoft.com/office/drawing/2014/main" id="{87143D87-872F-42F5-B2F1-D75E769B72B4}"/>
               </a:ext>
             </a:extLst>
           </p:cNvPr>
@@ -6874,9 +7407,10 @@
           <a:lstStyle/>
           <a:p>
             <a:r>
-              <a:rPr lang="en-US" dirty="0"/>
-              <a:t>Fibonacci</a:t>
-            </a:r>
+              <a:rPr lang="en-US" dirty="0" err="1"/>
+              <a:t>bunnyEars</a:t>
+            </a:r>
+            <a:endParaRPr lang="en-US" dirty="0"/>
           </a:p>
         </p:txBody>
       </p:sp>
@@ -6885,7 +7419,7 @@
           <p:cNvPr id="5" name="TextBox 4">
             <a:extLst>
               <a:ext uri="{FF2B5EF4-FFF2-40B4-BE49-F238E27FC236}">
-                <a16:creationId xmlns:a16="http://schemas.microsoft.com/office/drawing/2014/main" id="{F583CDF8-6B97-99EC-E628-09A84759DA8C}"/>
+                <a16:creationId xmlns:a16="http://schemas.microsoft.com/office/drawing/2014/main" id="{846D74BE-A868-E630-5592-C8B4B8637905}"/>
               </a:ext>
             </a:extLst>
           </p:cNvPr>
@@ -6894,8 +7428,8 @@
         </p:nvSpPr>
         <p:spPr>
           <a:xfrm>
-            <a:off x="838200" y="1752600"/>
-            <a:ext cx="7467600" cy="4524315"/>
+            <a:off x="381000" y="2274838"/>
+            <a:ext cx="7772400" cy="3046988"/>
           </a:xfrm>
           <a:prstGeom prst="rect">
             <a:avLst/>
@@ -6914,17 +7448,17 @@
             </a:r>
             <a:r>
               <a:rPr lang="en-US" sz="3200" dirty="0" err="1"/>
-              <a:t>fibonacci</a:t>
+              <a:t>bunnyEars</a:t>
             </a:r>
             <a:r>
               <a:rPr lang="en-US" sz="3200" dirty="0"/>
-              <a:t>(int n) {</a:t>
+              <a:t>(int bunnies) {</a:t>
             </a:r>
           </a:p>
           <a:p>
             <a:r>
               <a:rPr lang="en-US" sz="3200" dirty="0"/>
-              <a:t>  if (n==0) {</a:t>
+              <a:t>  if (bunnies == 0) {</a:t>
             </a:r>
           </a:p>
           <a:p>
@@ -6942,41 +7476,15 @@
           <a:p>
             <a:r>
               <a:rPr lang="en-US" sz="3200" dirty="0"/>
-              <a:t>  if (n==1 || n==2) {</a:t>
-            </a:r>
-          </a:p>
-          <a:p>
+              <a:t>  return 2 + </a:t>
+            </a:r>
+            <a:r>
+              <a:rPr lang="en-US" sz="3200" dirty="0" err="1"/>
+              <a:t>bunnyEars</a:t>
+            </a:r>
             <a:r>
               <a:rPr lang="en-US" sz="3200" dirty="0"/>
-              <a:t>    return 1;</a:t>
-            </a:r>
-          </a:p>
-          <a:p>
-            <a:r>
-              <a:rPr lang="en-US" sz="3200" dirty="0"/>
-              <a:t>  }</a:t>
-            </a:r>
-          </a:p>
-          <a:p>
-            <a:r>
-              <a:rPr lang="en-US" sz="3200" dirty="0"/>
-              <a:t>  return </a:t>
-            </a:r>
-            <a:r>
-              <a:rPr lang="en-US" sz="3200" dirty="0" err="1"/>
-              <a:t>fibonacci</a:t>
-            </a:r>
-            <a:r>
-              <a:rPr lang="en-US" sz="3200" dirty="0"/>
-              <a:t>(n-1) + </a:t>
-            </a:r>
-            <a:r>
-              <a:rPr lang="en-US" sz="3200" dirty="0" err="1"/>
-              <a:t>fibonacci</a:t>
-            </a:r>
-            <a:r>
-              <a:rPr lang="en-US" sz="3200" dirty="0"/>
-              <a:t>(n-2);</a:t>
+              <a:t>(bunnies-1);</a:t>
             </a:r>
           </a:p>
           <a:p>
@@ -6990,7 +7498,7 @@
     </p:spTree>
     <p:extLst>
       <p:ext uri="{BB962C8B-B14F-4D97-AF65-F5344CB8AC3E}">
-        <p14:creationId xmlns:p14="http://schemas.microsoft.com/office/powerpoint/2010/main" val="1828643523"/>
+        <p14:creationId xmlns:p14="http://schemas.microsoft.com/office/powerpoint/2010/main" val="456599958"/>
       </p:ext>
     </p:extLst>
   </p:cSld>
@@ -7022,6 +7530,453 @@
           <p:cNvPr id="2" name="Title 1">
             <a:extLst>
               <a:ext uri="{FF2B5EF4-FFF2-40B4-BE49-F238E27FC236}">
+                <a16:creationId xmlns:a16="http://schemas.microsoft.com/office/drawing/2014/main" id="{1656ABEE-5571-3224-B213-549F079EC357}"/>
+              </a:ext>
+            </a:extLst>
+          </p:cNvPr>
+          <p:cNvSpPr>
+            <a:spLocks noGrp="1"/>
+          </p:cNvSpPr>
+          <p:nvPr>
+            <p:ph type="title"/>
+          </p:nvPr>
+        </p:nvSpPr>
+        <p:spPr/>
+        <p:txBody>
+          <a:bodyPr/>
+          <a:lstStyle/>
+          <a:p>
+            <a:r>
+              <a:rPr lang="en-US" dirty="0"/>
+              <a:t>bunnyEars2</a:t>
+            </a:r>
+          </a:p>
+        </p:txBody>
+      </p:sp>
+      <p:sp>
+        <p:nvSpPr>
+          <p:cNvPr id="5" name="TextBox 4">
+            <a:extLst>
+              <a:ext uri="{FF2B5EF4-FFF2-40B4-BE49-F238E27FC236}">
+                <a16:creationId xmlns:a16="http://schemas.microsoft.com/office/drawing/2014/main" id="{DC4304E0-EE07-8653-E255-92DB9F308450}"/>
+              </a:ext>
+            </a:extLst>
+          </p:cNvPr>
+          <p:cNvSpPr txBox="1"/>
+          <p:nvPr/>
+        </p:nvSpPr>
+        <p:spPr>
+          <a:xfrm>
+            <a:off x="457200" y="1859340"/>
+            <a:ext cx="8229600" cy="4524315"/>
+          </a:xfrm>
+          <a:prstGeom prst="rect">
+            <a:avLst/>
+          </a:prstGeom>
+          <a:noFill/>
+        </p:spPr>
+        <p:txBody>
+          <a:bodyPr wrap="square">
+            <a:spAutoFit/>
+          </a:bodyPr>
+          <a:lstStyle/>
+          <a:p>
+            <a:r>
+              <a:rPr lang="en-US" sz="3200" dirty="0"/>
+              <a:t>public int bunnyEars2(int bunnies) {</a:t>
+            </a:r>
+          </a:p>
+          <a:p>
+            <a:r>
+              <a:rPr lang="en-US" sz="3200" dirty="0"/>
+              <a:t>  if (bunnies==0) {</a:t>
+            </a:r>
+          </a:p>
+          <a:p>
+            <a:r>
+              <a:rPr lang="en-US" sz="3200" dirty="0"/>
+              <a:t>    return 0;</a:t>
+            </a:r>
+          </a:p>
+          <a:p>
+            <a:r>
+              <a:rPr lang="en-US" sz="3200" dirty="0"/>
+              <a:t>  }</a:t>
+            </a:r>
+          </a:p>
+          <a:p>
+            <a:r>
+              <a:rPr lang="en-US" sz="3200" dirty="0"/>
+              <a:t>  if (bunnies%2==0){</a:t>
+            </a:r>
+          </a:p>
+          <a:p>
+            <a:r>
+              <a:rPr lang="en-US" sz="3200" dirty="0"/>
+              <a:t>    return 3 + bunnyEars2(bunnies-1);</a:t>
+            </a:r>
+          </a:p>
+          <a:p>
+            <a:r>
+              <a:rPr lang="en-US" sz="3200" dirty="0"/>
+              <a:t>  }</a:t>
+            </a:r>
+          </a:p>
+          <a:p>
+            <a:r>
+              <a:rPr lang="en-US" sz="3200" dirty="0"/>
+              <a:t>  return 2 + bunnyEars2(bunnies-1);</a:t>
+            </a:r>
+          </a:p>
+          <a:p>
+            <a:r>
+              <a:rPr lang="en-US" sz="3200" dirty="0"/>
+              <a:t>}</a:t>
+            </a:r>
+          </a:p>
+        </p:txBody>
+      </p:sp>
+    </p:spTree>
+    <p:extLst>
+      <p:ext uri="{BB962C8B-B14F-4D97-AF65-F5344CB8AC3E}">
+        <p14:creationId xmlns:p14="http://schemas.microsoft.com/office/powerpoint/2010/main" val="1758280130"/>
+      </p:ext>
+    </p:extLst>
+  </p:cSld>
+  <p:clrMapOvr>
+    <a:masterClrMapping/>
+  </p:clrMapOvr>
+</p:sld>
+</file>
+
+<file path=ppt/slides/slide15.xml><?xml version="1.0" encoding="utf-8"?>
+<p:sld xmlns:a="http://schemas.openxmlformats.org/drawingml/2006/main" xmlns:r="http://schemas.openxmlformats.org/officeDocument/2006/relationships" xmlns:p="http://schemas.openxmlformats.org/presentationml/2006/main" show="0">
+  <p:cSld>
+    <p:spTree>
+      <p:nvGrpSpPr>
+        <p:cNvPr id="1" name=""/>
+        <p:cNvGrpSpPr/>
+        <p:nvPr/>
+      </p:nvGrpSpPr>
+      <p:grpSpPr>
+        <a:xfrm>
+          <a:off x="0" y="0"/>
+          <a:ext cx="0" cy="0"/>
+          <a:chOff x="0" y="0"/>
+          <a:chExt cx="0" cy="0"/>
+        </a:xfrm>
+      </p:grpSpPr>
+      <p:sp>
+        <p:nvSpPr>
+          <p:cNvPr id="2" name="Title 1">
+            <a:extLst>
+              <a:ext uri="{FF2B5EF4-FFF2-40B4-BE49-F238E27FC236}">
+                <a16:creationId xmlns:a16="http://schemas.microsoft.com/office/drawing/2014/main" id="{BEC9C5B3-78B1-C001-B52A-0B0B8645FB14}"/>
+              </a:ext>
+            </a:extLst>
+          </p:cNvPr>
+          <p:cNvSpPr>
+            <a:spLocks noGrp="1"/>
+          </p:cNvSpPr>
+          <p:nvPr>
+            <p:ph type="title"/>
+          </p:nvPr>
+        </p:nvSpPr>
+        <p:spPr/>
+        <p:txBody>
+          <a:bodyPr/>
+          <a:lstStyle/>
+          <a:p>
+            <a:r>
+              <a:rPr lang="en-US" dirty="0"/>
+              <a:t>Count 7</a:t>
+            </a:r>
+          </a:p>
+        </p:txBody>
+      </p:sp>
+      <p:sp>
+        <p:nvSpPr>
+          <p:cNvPr id="5" name="TextBox 4">
+            <a:extLst>
+              <a:ext uri="{FF2B5EF4-FFF2-40B4-BE49-F238E27FC236}">
+                <a16:creationId xmlns:a16="http://schemas.microsoft.com/office/drawing/2014/main" id="{EDB83B16-A927-E42E-0777-63EC1525014C}"/>
+              </a:ext>
+            </a:extLst>
+          </p:cNvPr>
+          <p:cNvSpPr txBox="1"/>
+          <p:nvPr/>
+        </p:nvSpPr>
+        <p:spPr>
+          <a:xfrm>
+            <a:off x="685800" y="1859340"/>
+            <a:ext cx="7620000" cy="4524315"/>
+          </a:xfrm>
+          <a:prstGeom prst="rect">
+            <a:avLst/>
+          </a:prstGeom>
+          <a:noFill/>
+        </p:spPr>
+        <p:txBody>
+          <a:bodyPr wrap="square">
+            <a:spAutoFit/>
+          </a:bodyPr>
+          <a:lstStyle/>
+          <a:p>
+            <a:r>
+              <a:rPr lang="en-US" sz="3200" dirty="0"/>
+              <a:t>public int count7(int n) {</a:t>
+            </a:r>
+          </a:p>
+          <a:p>
+            <a:r>
+              <a:rPr lang="en-US" sz="3200" dirty="0"/>
+              <a:t>  if (n==0) {</a:t>
+            </a:r>
+          </a:p>
+          <a:p>
+            <a:r>
+              <a:rPr lang="en-US" sz="3200" dirty="0"/>
+              <a:t>    return 0;</a:t>
+            </a:r>
+          </a:p>
+          <a:p>
+            <a:r>
+              <a:rPr lang="en-US" sz="3200" dirty="0"/>
+              <a:t>  }</a:t>
+            </a:r>
+          </a:p>
+          <a:p>
+            <a:r>
+              <a:rPr lang="en-US" sz="3200" dirty="0"/>
+              <a:t>  if (n%10 == 7) {</a:t>
+            </a:r>
+          </a:p>
+          <a:p>
+            <a:r>
+              <a:rPr lang="en-US" sz="3200" dirty="0"/>
+              <a:t>    return 1 + count7(n/10);</a:t>
+            </a:r>
+          </a:p>
+          <a:p>
+            <a:r>
+              <a:rPr lang="en-US" sz="3200" dirty="0"/>
+              <a:t>  }</a:t>
+            </a:r>
+          </a:p>
+          <a:p>
+            <a:r>
+              <a:rPr lang="en-US" sz="3200" dirty="0"/>
+              <a:t>  return count7(n/10);</a:t>
+            </a:r>
+          </a:p>
+          <a:p>
+            <a:r>
+              <a:rPr lang="en-US" sz="3200" dirty="0"/>
+              <a:t>}</a:t>
+            </a:r>
+          </a:p>
+        </p:txBody>
+      </p:sp>
+    </p:spTree>
+    <p:extLst>
+      <p:ext uri="{BB962C8B-B14F-4D97-AF65-F5344CB8AC3E}">
+        <p14:creationId xmlns:p14="http://schemas.microsoft.com/office/powerpoint/2010/main" val="3394342281"/>
+      </p:ext>
+    </p:extLst>
+  </p:cSld>
+  <p:clrMapOvr>
+    <a:masterClrMapping/>
+  </p:clrMapOvr>
+</p:sld>
+</file>
+
+<file path=ppt/slides/slide16.xml><?xml version="1.0" encoding="utf-8"?>
+<p:sld xmlns:a="http://schemas.openxmlformats.org/drawingml/2006/main" xmlns:r="http://schemas.openxmlformats.org/officeDocument/2006/relationships" xmlns:p="http://schemas.openxmlformats.org/presentationml/2006/main" show="0">
+  <p:cSld>
+    <p:spTree>
+      <p:nvGrpSpPr>
+        <p:cNvPr id="1" name=""/>
+        <p:cNvGrpSpPr/>
+        <p:nvPr/>
+      </p:nvGrpSpPr>
+      <p:grpSpPr>
+        <a:xfrm>
+          <a:off x="0" y="0"/>
+          <a:ext cx="0" cy="0"/>
+          <a:chOff x="0" y="0"/>
+          <a:chExt cx="0" cy="0"/>
+        </a:xfrm>
+      </p:grpSpPr>
+      <p:sp>
+        <p:nvSpPr>
+          <p:cNvPr id="2" name="Title 1">
+            <a:extLst>
+              <a:ext uri="{FF2B5EF4-FFF2-40B4-BE49-F238E27FC236}">
+                <a16:creationId xmlns:a16="http://schemas.microsoft.com/office/drawing/2014/main" id="{3E745C04-70D1-EBE0-4E01-F2C1FF9615D7}"/>
+              </a:ext>
+            </a:extLst>
+          </p:cNvPr>
+          <p:cNvSpPr>
+            <a:spLocks noGrp="1"/>
+          </p:cNvSpPr>
+          <p:nvPr>
+            <p:ph type="title"/>
+          </p:nvPr>
+        </p:nvSpPr>
+        <p:spPr/>
+        <p:txBody>
+          <a:bodyPr/>
+          <a:lstStyle/>
+          <a:p>
+            <a:r>
+              <a:rPr lang="en-US" dirty="0"/>
+              <a:t>Fibonacci</a:t>
+            </a:r>
+          </a:p>
+        </p:txBody>
+      </p:sp>
+      <p:sp>
+        <p:nvSpPr>
+          <p:cNvPr id="5" name="TextBox 4">
+            <a:extLst>
+              <a:ext uri="{FF2B5EF4-FFF2-40B4-BE49-F238E27FC236}">
+                <a16:creationId xmlns:a16="http://schemas.microsoft.com/office/drawing/2014/main" id="{F583CDF8-6B97-99EC-E628-09A84759DA8C}"/>
+              </a:ext>
+            </a:extLst>
+          </p:cNvPr>
+          <p:cNvSpPr txBox="1"/>
+          <p:nvPr/>
+        </p:nvSpPr>
+        <p:spPr>
+          <a:xfrm>
+            <a:off x="838200" y="1752600"/>
+            <a:ext cx="7467600" cy="4524315"/>
+          </a:xfrm>
+          <a:prstGeom prst="rect">
+            <a:avLst/>
+          </a:prstGeom>
+          <a:noFill/>
+        </p:spPr>
+        <p:txBody>
+          <a:bodyPr wrap="square">
+            <a:spAutoFit/>
+          </a:bodyPr>
+          <a:lstStyle/>
+          <a:p>
+            <a:r>
+              <a:rPr lang="en-US" sz="3200" dirty="0"/>
+              <a:t>public int </a:t>
+            </a:r>
+            <a:r>
+              <a:rPr lang="en-US" sz="3200" dirty="0" err="1"/>
+              <a:t>fibonacci</a:t>
+            </a:r>
+            <a:r>
+              <a:rPr lang="en-US" sz="3200" dirty="0"/>
+              <a:t>(int n) {</a:t>
+            </a:r>
+          </a:p>
+          <a:p>
+            <a:r>
+              <a:rPr lang="en-US" sz="3200" dirty="0"/>
+              <a:t>  if (n==0) {</a:t>
+            </a:r>
+          </a:p>
+          <a:p>
+            <a:r>
+              <a:rPr lang="en-US" sz="3200" dirty="0"/>
+              <a:t>    return 0;</a:t>
+            </a:r>
+          </a:p>
+          <a:p>
+            <a:r>
+              <a:rPr lang="en-US" sz="3200" dirty="0"/>
+              <a:t>  }</a:t>
+            </a:r>
+          </a:p>
+          <a:p>
+            <a:r>
+              <a:rPr lang="en-US" sz="3200" dirty="0"/>
+              <a:t>  if (n==1 || n==2) {</a:t>
+            </a:r>
+          </a:p>
+          <a:p>
+            <a:r>
+              <a:rPr lang="en-US" sz="3200" dirty="0"/>
+              <a:t>    return 1;</a:t>
+            </a:r>
+          </a:p>
+          <a:p>
+            <a:r>
+              <a:rPr lang="en-US" sz="3200" dirty="0"/>
+              <a:t>  }</a:t>
+            </a:r>
+          </a:p>
+          <a:p>
+            <a:r>
+              <a:rPr lang="en-US" sz="3200" dirty="0"/>
+              <a:t>  return </a:t>
+            </a:r>
+            <a:r>
+              <a:rPr lang="en-US" sz="3200" dirty="0" err="1"/>
+              <a:t>fibonacci</a:t>
+            </a:r>
+            <a:r>
+              <a:rPr lang="en-US" sz="3200" dirty="0"/>
+              <a:t>(n-1) + </a:t>
+            </a:r>
+            <a:r>
+              <a:rPr lang="en-US" sz="3200" dirty="0" err="1"/>
+              <a:t>fibonacci</a:t>
+            </a:r>
+            <a:r>
+              <a:rPr lang="en-US" sz="3200" dirty="0"/>
+              <a:t>(n-2);</a:t>
+            </a:r>
+          </a:p>
+          <a:p>
+            <a:r>
+              <a:rPr lang="en-US" sz="3200" dirty="0"/>
+              <a:t>}</a:t>
+            </a:r>
+          </a:p>
+        </p:txBody>
+      </p:sp>
+    </p:spTree>
+    <p:extLst>
+      <p:ext uri="{BB962C8B-B14F-4D97-AF65-F5344CB8AC3E}">
+        <p14:creationId xmlns:p14="http://schemas.microsoft.com/office/powerpoint/2010/main" val="1828643523"/>
+      </p:ext>
+    </p:extLst>
+  </p:cSld>
+  <p:clrMapOvr>
+    <a:masterClrMapping/>
+  </p:clrMapOvr>
+</p:sld>
+</file>
+
+<file path=ppt/slides/slide17.xml><?xml version="1.0" encoding="utf-8"?>
+<p:sld xmlns:a="http://schemas.openxmlformats.org/drawingml/2006/main" xmlns:r="http://schemas.openxmlformats.org/officeDocument/2006/relationships" xmlns:p="http://schemas.openxmlformats.org/presentationml/2006/main" show="0">
+  <p:cSld>
+    <p:spTree>
+      <p:nvGrpSpPr>
+        <p:cNvPr id="1" name=""/>
+        <p:cNvGrpSpPr/>
+        <p:nvPr/>
+      </p:nvGrpSpPr>
+      <p:grpSpPr>
+        <a:xfrm>
+          <a:off x="0" y="0"/>
+          <a:ext cx="0" cy="0"/>
+          <a:chOff x="0" y="0"/>
+          <a:chExt cx="0" cy="0"/>
+        </a:xfrm>
+      </p:grpSpPr>
+      <p:sp>
+        <p:nvSpPr>
+          <p:cNvPr id="2" name="Title 1">
+            <a:extLst>
+              <a:ext uri="{FF2B5EF4-FFF2-40B4-BE49-F238E27FC236}">
                 <a16:creationId xmlns:a16="http://schemas.microsoft.com/office/drawing/2014/main" id="{2406DC25-DB18-ECA1-0B53-811EA3E9F706}"/>
               </a:ext>
             </a:extLst>
@@ -7204,7 +8159,7 @@
 </p:sld>
 </file>
 
-<file path=ppt/slides/slide15.xml><?xml version="1.0" encoding="utf-8"?>
+<file path=ppt/slides/slide18.xml><?xml version="1.0" encoding="utf-8"?>
 <p:sld xmlns:a="http://schemas.openxmlformats.org/drawingml/2006/main" xmlns:r="http://schemas.openxmlformats.org/officeDocument/2006/relationships" xmlns:p="http://schemas.openxmlformats.org/presentationml/2006/main">
   <p:cSld>
     <p:spTree>
@@ -7299,6 +8254,135 @@
     <p:extLst>
       <p:ext uri="{BB962C8B-B14F-4D97-AF65-F5344CB8AC3E}">
         <p14:creationId xmlns:p14="http://schemas.microsoft.com/office/powerpoint/2010/main" val="1027380735"/>
+      </p:ext>
+    </p:extLst>
+  </p:cSld>
+  <p:clrMapOvr>
+    <a:masterClrMapping/>
+  </p:clrMapOvr>
+</p:sld>
+</file>
+
+<file path=ppt/slides/slide19.xml><?xml version="1.0" encoding="utf-8"?>
+<p:sld xmlns:a="http://schemas.openxmlformats.org/drawingml/2006/main" xmlns:r="http://schemas.openxmlformats.org/officeDocument/2006/relationships" xmlns:p="http://schemas.openxmlformats.org/presentationml/2006/main">
+  <p:cSld>
+    <p:spTree>
+      <p:nvGrpSpPr>
+        <p:cNvPr id="1" name=""/>
+        <p:cNvGrpSpPr/>
+        <p:nvPr/>
+      </p:nvGrpSpPr>
+      <p:grpSpPr>
+        <a:xfrm>
+          <a:off x="0" y="0"/>
+          <a:ext cx="0" cy="0"/>
+          <a:chOff x="0" y="0"/>
+          <a:chExt cx="0" cy="0"/>
+        </a:xfrm>
+      </p:grpSpPr>
+      <p:sp>
+        <p:nvSpPr>
+          <p:cNvPr id="2" name="Title 1">
+            <a:extLst>
+              <a:ext uri="{FF2B5EF4-FFF2-40B4-BE49-F238E27FC236}">
+                <a16:creationId xmlns:a16="http://schemas.microsoft.com/office/drawing/2014/main" id="{F5A366D3-AE72-A447-BDC6-005852FB4EAC}"/>
+              </a:ext>
+            </a:extLst>
+          </p:cNvPr>
+          <p:cNvSpPr>
+            <a:spLocks noGrp="1"/>
+          </p:cNvSpPr>
+          <p:nvPr>
+            <p:ph type="title"/>
+          </p:nvPr>
+        </p:nvSpPr>
+        <p:spPr/>
+        <p:txBody>
+          <a:bodyPr/>
+          <a:lstStyle/>
+          <a:p>
+            <a:r>
+              <a:rPr lang="en-US" dirty="0"/>
+              <a:t>Fun Overlap</a:t>
+            </a:r>
+          </a:p>
+        </p:txBody>
+      </p:sp>
+      <p:sp>
+        <p:nvSpPr>
+          <p:cNvPr id="3" name="Content Placeholder 2">
+            <a:extLst>
+              <a:ext uri="{FF2B5EF4-FFF2-40B4-BE49-F238E27FC236}">
+                <a16:creationId xmlns:a16="http://schemas.microsoft.com/office/drawing/2014/main" id="{B513513B-DE92-58FC-EAC1-621A1F2F0BEB}"/>
+              </a:ext>
+            </a:extLst>
+          </p:cNvPr>
+          <p:cNvSpPr>
+            <a:spLocks noGrp="1"/>
+          </p:cNvSpPr>
+          <p:nvPr>
+            <p:ph idx="1"/>
+          </p:nvPr>
+        </p:nvSpPr>
+        <p:spPr>
+          <a:xfrm>
+            <a:off x="286473" y="1417638"/>
+            <a:ext cx="8571053" cy="4525963"/>
+          </a:xfrm>
+        </p:spPr>
+        <p:txBody>
+          <a:bodyPr/>
+          <a:lstStyle/>
+          <a:p>
+            <a:pPr marL="0" indent="0">
+              <a:buNone/>
+            </a:pPr>
+            <a:r>
+              <a:rPr lang="en-US" sz="2800" dirty="0">
+                <a:hlinkClick r:id="rId2"/>
+              </a:rPr>
+              <a:t>https://futurumcareers.com/solving-the-tower-of-hanoi</a:t>
+            </a:r>
+            <a:endParaRPr lang="en-US" sz="2800" dirty="0"/>
+          </a:p>
+          <a:p>
+            <a:endParaRPr lang="en-US" dirty="0"/>
+          </a:p>
+        </p:txBody>
+      </p:sp>
+      <p:pic>
+        <p:nvPicPr>
+          <p:cNvPr id="5" name="Picture 4">
+            <a:extLst>
+              <a:ext uri="{FF2B5EF4-FFF2-40B4-BE49-F238E27FC236}">
+                <a16:creationId xmlns:a16="http://schemas.microsoft.com/office/drawing/2014/main" id="{6FE3495D-4485-396B-A7D3-5B1CB2076CCC}"/>
+              </a:ext>
+            </a:extLst>
+          </p:cNvPr>
+          <p:cNvPicPr>
+            <a:picLocks noChangeAspect="1"/>
+          </p:cNvPicPr>
+          <p:nvPr/>
+        </p:nvPicPr>
+        <p:blipFill rotWithShape="1">
+          <a:blip r:embed="rId3"/>
+          <a:srcRect l="3741" r="2610"/>
+          <a:stretch/>
+        </p:blipFill>
+        <p:spPr>
+          <a:xfrm>
+            <a:off x="45963" y="1956123"/>
+            <a:ext cx="9098037" cy="4901878"/>
+          </a:xfrm>
+          <a:prstGeom prst="rect">
+            <a:avLst/>
+          </a:prstGeom>
+        </p:spPr>
+      </p:pic>
+    </p:spTree>
+    <p:extLst>
+      <p:ext uri="{BB962C8B-B14F-4D97-AF65-F5344CB8AC3E}">
+        <p14:creationId xmlns:p14="http://schemas.microsoft.com/office/powerpoint/2010/main" val="4130146565"/>
       </p:ext>
     </p:extLst>
   </p:cSld>
@@ -7368,36 +8452,36 @@
           <a:lstStyle/>
           <a:p>
             <a:r>
-              <a:rPr lang="en-US"/>
-              <a:t>The next 4 class days:</a:t>
+              <a:rPr lang="en-US" dirty="0"/>
+              <a:t>The next few class days:</a:t>
             </a:r>
           </a:p>
           <a:p>
             <a:pPr lvl="1"/>
             <a:r>
-              <a:rPr lang="en-US"/>
+              <a:rPr lang="en-US" dirty="0"/>
               <a:t>A new way to think: </a:t>
             </a:r>
             <a:r>
-              <a:rPr lang="en-US" b="1"/>
+              <a:rPr lang="en-US" b="1" dirty="0"/>
               <a:t>Recursion</a:t>
             </a:r>
           </a:p>
           <a:p>
             <a:pPr lvl="1"/>
             <a:r>
-              <a:rPr lang="en-US"/>
+              <a:rPr lang="en-US" dirty="0"/>
               <a:t>A new way to break up and re-use code: </a:t>
             </a:r>
             <a:r>
-              <a:rPr lang="en-US" b="1"/>
+              <a:rPr lang="en-US" b="1" dirty="0"/>
               <a:t>Interfaces</a:t>
             </a:r>
           </a:p>
           <a:p>
             <a:pPr lvl="2"/>
             <a:r>
-              <a:rPr lang="en-US"/>
+              <a:rPr lang="en-US" dirty="0"/>
               <a:t>Making interactive apps requires this</a:t>
             </a:r>
           </a:p>
@@ -7476,75 +8560,75 @@
           <a:lstStyle/>
           <a:p>
             <a:r>
-              <a:rPr lang="en-US"/>
+              <a:rPr lang="en-US" dirty="0"/>
               <a:t>A solution technique where the same computation </a:t>
             </a:r>
             <a:r>
-              <a:rPr lang="en-US" b="1"/>
+              <a:rPr lang="en-US" b="1" dirty="0"/>
               <a:t>occurs repeatedly </a:t>
             </a:r>
             <a:br>
-              <a:rPr lang="en-US"/>
+              <a:rPr lang="en-US" dirty="0"/>
             </a:br>
             <a:r>
-              <a:rPr lang="en-US"/>
+              <a:rPr lang="en-US" dirty="0"/>
               <a:t>as the problem is solved</a:t>
             </a:r>
           </a:p>
           <a:p>
-            <a:endParaRPr lang="en-US"/>
-          </a:p>
-          <a:p>
-            <a:r>
-              <a:rPr lang="en-US"/>
+            <a:endParaRPr lang="en-US" dirty="0"/>
+          </a:p>
+          <a:p>
+            <a:r>
+              <a:rPr lang="en-US" dirty="0"/>
               <a:t>Examples:</a:t>
             </a:r>
           </a:p>
           <a:p>
             <a:pPr lvl="1"/>
             <a:r>
-              <a:rPr lang="en-US" err="1"/>
+              <a:rPr lang="en-US" dirty="0" err="1"/>
               <a:t>Sierpinski</a:t>
             </a:r>
             <a:r>
-              <a:rPr lang="en-US"/>
+              <a:rPr lang="en-US" dirty="0"/>
               <a:t> Triangle:</a:t>
             </a:r>
             <a:br>
-              <a:rPr lang="en-US"/>
+              <a:rPr lang="en-US" dirty="0"/>
             </a:br>
             <a:r>
-              <a:rPr lang="en-US" sz="2100">
+              <a:rPr lang="en-US" sz="2100" dirty="0">
                 <a:hlinkClick r:id="rId3"/>
               </a:rPr>
               <a:t>https://en.wikipedia.org/wiki/Sierpinski_triangle</a:t>
             </a:r>
             <a:r>
-              <a:rPr lang="en-US" sz="2100"/>
+              <a:rPr lang="en-US" sz="2100" dirty="0"/>
               <a:t> </a:t>
             </a:r>
           </a:p>
           <a:p>
             <a:pPr lvl="1"/>
             <a:r>
-              <a:rPr lang="en-US"/>
+              <a:rPr lang="en-US" dirty="0"/>
               <a:t>Towers of Hanoi: </a:t>
             </a:r>
             <a:r>
-              <a:rPr lang="en-US" sz="2000">
+              <a:rPr lang="en-US" sz="2000" dirty="0">
                 <a:hlinkClick r:id="rId4"/>
               </a:rPr>
               <a:t>http://www.mathsisfun.com/games/towerofhanoi.html</a:t>
             </a:r>
             <a:r>
-              <a:rPr lang="en-US" sz="2000"/>
+              <a:rPr lang="en-US" sz="2000" dirty="0"/>
               <a:t> </a:t>
             </a:r>
             <a:br>
-              <a:rPr lang="en-US" sz="2000"/>
+              <a:rPr lang="en-US" sz="2000" dirty="0"/>
             </a:br>
             <a:r>
-              <a:rPr lang="en-US"/>
+              <a:rPr lang="en-US" dirty="0"/>
               <a:t>or search for Towers of Hanoi</a:t>
             </a:r>
           </a:p>
@@ -9441,6 +10525,156 @@
       </p:grpSpPr>
       <p:sp>
         <p:nvSpPr>
+          <p:cNvPr id="2" name="Title 1">
+            <a:extLst>
+              <a:ext uri="{FF2B5EF4-FFF2-40B4-BE49-F238E27FC236}">
+                <a16:creationId xmlns:a16="http://schemas.microsoft.com/office/drawing/2014/main" id="{583CB574-B1B1-B18C-0357-097FE3A03380}"/>
+              </a:ext>
+            </a:extLst>
+          </p:cNvPr>
+          <p:cNvSpPr>
+            <a:spLocks noGrp="1"/>
+          </p:cNvSpPr>
+          <p:nvPr>
+            <p:ph type="title"/>
+          </p:nvPr>
+        </p:nvSpPr>
+        <p:spPr>
+          <a:xfrm>
+            <a:off x="457200" y="274638"/>
+            <a:ext cx="3073078" cy="1143000"/>
+          </a:xfrm>
+        </p:spPr>
+        <p:txBody>
+          <a:bodyPr>
+            <a:normAutofit fontScale="90000"/>
+          </a:bodyPr>
+          <a:lstStyle/>
+          <a:p>
+            <a:r>
+              <a:rPr lang="en-US" dirty="0"/>
+              <a:t>Open Eclipse</a:t>
+            </a:r>
+          </a:p>
+        </p:txBody>
+      </p:sp>
+      <p:sp>
+        <p:nvSpPr>
+          <p:cNvPr id="3" name="Content Placeholder 2">
+            <a:extLst>
+              <a:ext uri="{FF2B5EF4-FFF2-40B4-BE49-F238E27FC236}">
+                <a16:creationId xmlns:a16="http://schemas.microsoft.com/office/drawing/2014/main" id="{1143F02C-3260-D5AD-1438-8261B8BB2DD4}"/>
+              </a:ext>
+            </a:extLst>
+          </p:cNvPr>
+          <p:cNvSpPr>
+            <a:spLocks noGrp="1"/>
+          </p:cNvSpPr>
+          <p:nvPr>
+            <p:ph idx="1"/>
+          </p:nvPr>
+        </p:nvSpPr>
+        <p:spPr/>
+        <p:txBody>
+          <a:bodyPr/>
+          <a:lstStyle/>
+          <a:p>
+            <a:endParaRPr lang="en-US"/>
+          </a:p>
+        </p:txBody>
+      </p:sp>
+      <p:pic>
+        <p:nvPicPr>
+          <p:cNvPr id="5" name="Picture 4">
+            <a:extLst>
+              <a:ext uri="{FF2B5EF4-FFF2-40B4-BE49-F238E27FC236}">
+                <a16:creationId xmlns:a16="http://schemas.microsoft.com/office/drawing/2014/main" id="{FAD3232A-DB0C-6A35-00FF-C036B8FA35D7}"/>
+              </a:ext>
+            </a:extLst>
+          </p:cNvPr>
+          <p:cNvPicPr>
+            <a:picLocks noChangeAspect="1"/>
+          </p:cNvPicPr>
+          <p:nvPr/>
+        </p:nvPicPr>
+        <p:blipFill>
+          <a:blip r:embed="rId2"/>
+          <a:stretch>
+            <a:fillRect/>
+          </a:stretch>
+        </p:blipFill>
+        <p:spPr>
+          <a:xfrm>
+            <a:off x="0" y="1532144"/>
+            <a:ext cx="9144000" cy="5325856"/>
+          </a:xfrm>
+          <a:prstGeom prst="rect">
+            <a:avLst/>
+          </a:prstGeom>
+        </p:spPr>
+      </p:pic>
+      <p:pic>
+        <p:nvPicPr>
+          <p:cNvPr id="7" name="Picture 6">
+            <a:extLst>
+              <a:ext uri="{FF2B5EF4-FFF2-40B4-BE49-F238E27FC236}">
+                <a16:creationId xmlns:a16="http://schemas.microsoft.com/office/drawing/2014/main" id="{5E675FFB-50BC-9D3D-4D5B-A56AF6BA36AF}"/>
+              </a:ext>
+            </a:extLst>
+          </p:cNvPr>
+          <p:cNvPicPr>
+            <a:picLocks noChangeAspect="1"/>
+          </p:cNvPicPr>
+          <p:nvPr/>
+        </p:nvPicPr>
+        <p:blipFill>
+          <a:blip r:embed="rId3"/>
+          <a:stretch>
+            <a:fillRect/>
+          </a:stretch>
+        </p:blipFill>
+        <p:spPr>
+          <a:xfrm>
+            <a:off x="4379865" y="373440"/>
+            <a:ext cx="3261263" cy="853733"/>
+          </a:xfrm>
+          <a:prstGeom prst="rect">
+            <a:avLst/>
+          </a:prstGeom>
+        </p:spPr>
+      </p:pic>
+    </p:spTree>
+    <p:extLst>
+      <p:ext uri="{BB962C8B-B14F-4D97-AF65-F5344CB8AC3E}">
+        <p14:creationId xmlns:p14="http://schemas.microsoft.com/office/powerpoint/2010/main" val="3167948908"/>
+      </p:ext>
+    </p:extLst>
+  </p:cSld>
+  <p:clrMapOvr>
+    <a:masterClrMapping/>
+  </p:clrMapOvr>
+</p:sld>
+</file>
+
+<file path=ppt/slides/slide7.xml><?xml version="1.0" encoding="utf-8"?>
+<p:sld xmlns:a="http://schemas.openxmlformats.org/drawingml/2006/main" xmlns:r="http://schemas.openxmlformats.org/officeDocument/2006/relationships" xmlns:p="http://schemas.openxmlformats.org/presentationml/2006/main">
+  <p:cSld>
+    <p:spTree>
+      <p:nvGrpSpPr>
+        <p:cNvPr id="1" name=""/>
+        <p:cNvGrpSpPr/>
+        <p:nvPr/>
+      </p:nvGrpSpPr>
+      <p:grpSpPr>
+        <a:xfrm>
+          <a:off x="0" y="0"/>
+          <a:ext cx="0" cy="0"/>
+          <a:chOff x="0" y="0"/>
+          <a:chExt cx="0" cy="0"/>
+        </a:xfrm>
+      </p:grpSpPr>
+      <p:sp>
+        <p:nvSpPr>
           <p:cNvPr id="3" name="Title 2"/>
           <p:cNvSpPr>
             <a:spLocks noGrp="1"/>
@@ -10845,380 +12079,6 @@
 </p:sld>
 </file>
 
-<file path=ppt/slides/slide7.xml><?xml version="1.0" encoding="utf-8"?>
-<p:sld xmlns:a="http://schemas.openxmlformats.org/drawingml/2006/main" xmlns:r="http://schemas.openxmlformats.org/officeDocument/2006/relationships" xmlns:p="http://schemas.openxmlformats.org/presentationml/2006/main">
-  <p:cSld>
-    <p:spTree>
-      <p:nvGrpSpPr>
-        <p:cNvPr id="1" name=""/>
-        <p:cNvGrpSpPr/>
-        <p:nvPr/>
-      </p:nvGrpSpPr>
-      <p:grpSpPr>
-        <a:xfrm>
-          <a:off x="0" y="0"/>
-          <a:ext cx="0" cy="0"/>
-          <a:chOff x="0" y="0"/>
-          <a:chExt cx="0" cy="0"/>
-        </a:xfrm>
-      </p:grpSpPr>
-      <p:sp>
-        <p:nvSpPr>
-          <p:cNvPr id="3" name="Title 2"/>
-          <p:cNvSpPr>
-            <a:spLocks noGrp="1"/>
-          </p:cNvSpPr>
-          <p:nvPr>
-            <p:ph type="title"/>
-          </p:nvPr>
-        </p:nvSpPr>
-        <p:spPr/>
-        <p:txBody>
-          <a:bodyPr/>
-          <a:lstStyle/>
-          <a:p>
-            <a:pPr>
-              <a:defRPr/>
-            </a:pPr>
-            <a:r>
-              <a:rPr lang="en-US"/>
-              <a:t>Programming Problem</a:t>
-            </a:r>
-          </a:p>
-        </p:txBody>
-      </p:sp>
-      <p:sp>
-        <p:nvSpPr>
-          <p:cNvPr id="15362" name="Content Placeholder 1"/>
-          <p:cNvSpPr>
-            <a:spLocks noGrp="1"/>
-          </p:cNvSpPr>
-          <p:nvPr>
-            <p:ph idx="1"/>
-          </p:nvPr>
-        </p:nvSpPr>
-        <p:spPr>
-          <a:xfrm>
-            <a:off x="457200" y="1481138"/>
-            <a:ext cx="8229600" cy="4525962"/>
-          </a:xfrm>
-        </p:spPr>
-        <p:txBody>
-          <a:bodyPr>
-            <a:normAutofit/>
-          </a:bodyPr>
-          <a:lstStyle/>
-          <a:p>
-            <a:pPr marL="0" indent="0">
-              <a:buNone/>
-            </a:pPr>
-            <a:r>
-              <a:rPr lang="en-US"/>
-              <a:t>Add a recursive method called </a:t>
-            </a:r>
-            <a:r>
-              <a:rPr lang="en-US" i="1" err="1"/>
-              <a:t>isPalindrome</a:t>
-            </a:r>
-            <a:r>
-              <a:rPr lang="en-US"/>
-              <a:t> to Sentence for computing whether Sentence is a palindrome</a:t>
-            </a:r>
-          </a:p>
-          <a:p>
-            <a:pPr marL="0" indent="0">
-              <a:buNone/>
-            </a:pPr>
-            <a:r>
-              <a:rPr lang="en-US" sz="2200">
-                <a:latin typeface="Courier New" panose="02070309020205020404" pitchFamily="49" charset="0"/>
-                <a:cs typeface="Courier New" panose="02070309020205020404" pitchFamily="49" charset="0"/>
-              </a:rPr>
-              <a:t>{</a:t>
-            </a:r>
-          </a:p>
-          <a:p>
-            <a:pPr marL="0" indent="0">
-              <a:buNone/>
-            </a:pPr>
-            <a:r>
-              <a:rPr lang="en-US" sz="2200">
-                <a:latin typeface="Courier New" panose="02070309020205020404" pitchFamily="49" charset="0"/>
-                <a:cs typeface="Courier New" panose="02070309020205020404" pitchFamily="49" charset="0"/>
-              </a:rPr>
-              <a:t>   Sentence s1 = </a:t>
-            </a:r>
-          </a:p>
-          <a:p>
-            <a:pPr marL="0" indent="0">
-              <a:buNone/>
-            </a:pPr>
-            <a:r>
-              <a:rPr lang="en-US" sz="2200">
-                <a:latin typeface="Courier New" panose="02070309020205020404" pitchFamily="49" charset="0"/>
-                <a:cs typeface="Courier New" panose="02070309020205020404" pitchFamily="49" charset="0"/>
-              </a:rPr>
-              <a:t>	new Sentence("A nut for a jar of tuna");</a:t>
-            </a:r>
-          </a:p>
-          <a:p>
-            <a:pPr marL="0" indent="0">
-              <a:buNone/>
-            </a:pPr>
-            <a:r>
-              <a:rPr lang="en-US" sz="2200">
-                <a:latin typeface="Courier New" panose="02070309020205020404" pitchFamily="49" charset="0"/>
-                <a:cs typeface="Courier New" panose="02070309020205020404" pitchFamily="49" charset="0"/>
-              </a:rPr>
-              <a:t>   </a:t>
-            </a:r>
-            <a:r>
-              <a:rPr lang="en-US" sz="2200" err="1">
-                <a:latin typeface="Courier New" panose="02070309020205020404" pitchFamily="49" charset="0"/>
-                <a:cs typeface="Courier New" panose="02070309020205020404" pitchFamily="49" charset="0"/>
-              </a:rPr>
-              <a:t>System.out.print</a:t>
-            </a:r>
-            <a:r>
-              <a:rPr lang="en-US" sz="2200">
-                <a:latin typeface="Courier New" panose="02070309020205020404" pitchFamily="49" charset="0"/>
-                <a:cs typeface="Courier New" panose="02070309020205020404" pitchFamily="49" charset="0"/>
-              </a:rPr>
-              <a:t>(s1.isPalindrome());</a:t>
-            </a:r>
-          </a:p>
-          <a:p>
-            <a:pPr marL="0" indent="0">
-              <a:buNone/>
-            </a:pPr>
-            <a:r>
-              <a:rPr lang="en-US" sz="2200">
-                <a:latin typeface="Courier New" panose="02070309020205020404" pitchFamily="49" charset="0"/>
-                <a:cs typeface="Courier New" panose="02070309020205020404" pitchFamily="49" charset="0"/>
-              </a:rPr>
-              <a:t>}</a:t>
-            </a:r>
-          </a:p>
-        </p:txBody>
-      </p:sp>
-      <p:grpSp>
-        <p:nvGrpSpPr>
-          <p:cNvPr id="15364" name="Group 6"/>
-          <p:cNvGrpSpPr>
-            <a:grpSpLocks/>
-          </p:cNvGrpSpPr>
-          <p:nvPr/>
-        </p:nvGrpSpPr>
-        <p:grpSpPr bwMode="auto">
-          <a:xfrm>
-            <a:off x="5029200" y="4648200"/>
-            <a:ext cx="3581400" cy="1754921"/>
-            <a:chOff x="5334000" y="2505670"/>
-            <a:chExt cx="3581400" cy="1754578"/>
-          </a:xfrm>
-        </p:grpSpPr>
-        <p:sp>
-          <p:nvSpPr>
-            <p:cNvPr id="4" name="TextBox 3"/>
-            <p:cNvSpPr txBox="1"/>
-            <p:nvPr/>
-          </p:nvSpPr>
-          <p:spPr>
-            <a:xfrm>
-              <a:off x="5334000" y="2505670"/>
-              <a:ext cx="3581400" cy="512662"/>
-            </a:xfrm>
-            <a:prstGeom prst="rect">
-              <a:avLst/>
-            </a:prstGeom>
-          </p:spPr>
-          <p:style>
-            <a:lnRef idx="2">
-              <a:schemeClr val="accent1">
-                <a:shade val="50000"/>
-              </a:schemeClr>
-            </a:lnRef>
-            <a:fillRef idx="1">
-              <a:schemeClr val="accent1"/>
-            </a:fillRef>
-            <a:effectRef idx="0">
-              <a:schemeClr val="accent1"/>
-            </a:effectRef>
-            <a:fontRef idx="minor">
-              <a:schemeClr val="lt1"/>
-            </a:fontRef>
-          </p:style>
-          <p:txBody>
-            <a:bodyPr>
-              <a:spAutoFit/>
-            </a:bodyPr>
-            <a:lstStyle/>
-            <a:p>
-              <a:pPr algn="ctr">
-                <a:defRPr/>
-              </a:pPr>
-              <a:r>
-                <a:rPr lang="en-US" sz="2400">
-                  <a:cs typeface="Lucida Sans Unicode" pitchFamily="34" charset="0"/>
-                </a:rPr>
-                <a:t>Sentence</a:t>
-              </a:r>
-            </a:p>
-          </p:txBody>
-        </p:sp>
-        <p:sp>
-          <p:nvSpPr>
-            <p:cNvPr id="5" name="TextBox 4"/>
-            <p:cNvSpPr txBox="1"/>
-            <p:nvPr/>
-          </p:nvSpPr>
-          <p:spPr>
-            <a:xfrm>
-              <a:off x="5334000" y="2967542"/>
-              <a:ext cx="3581400" cy="512663"/>
-            </a:xfrm>
-            <a:prstGeom prst="rect">
-              <a:avLst/>
-            </a:prstGeom>
-          </p:spPr>
-          <p:style>
-            <a:lnRef idx="2">
-              <a:schemeClr val="accent1">
-                <a:shade val="50000"/>
-              </a:schemeClr>
-            </a:lnRef>
-            <a:fillRef idx="1">
-              <a:schemeClr val="accent1"/>
-            </a:fillRef>
-            <a:effectRef idx="0">
-              <a:schemeClr val="accent1"/>
-            </a:effectRef>
-            <a:fontRef idx="minor">
-              <a:schemeClr val="lt1"/>
-            </a:fontRef>
-          </p:style>
-          <p:txBody>
-            <a:bodyPr>
-              <a:spAutoFit/>
-            </a:bodyPr>
-            <a:lstStyle/>
-            <a:p>
-              <a:pPr>
-                <a:defRPr/>
-              </a:pPr>
-              <a:r>
-                <a:rPr lang="en-US" sz="2400">
-                  <a:cs typeface="Lucida Sans Unicode" pitchFamily="34" charset="0"/>
-                </a:rPr>
-                <a:t>String text</a:t>
-              </a:r>
-            </a:p>
-          </p:txBody>
-        </p:sp>
-        <p:sp>
-          <p:nvSpPr>
-            <p:cNvPr id="6" name="TextBox 5"/>
-            <p:cNvSpPr txBox="1"/>
-            <p:nvPr/>
-          </p:nvSpPr>
-          <p:spPr>
-            <a:xfrm>
-              <a:off x="5334000" y="3429414"/>
-              <a:ext cx="3581400" cy="830834"/>
-            </a:xfrm>
-            <a:prstGeom prst="rect">
-              <a:avLst/>
-            </a:prstGeom>
-          </p:spPr>
-          <p:style>
-            <a:lnRef idx="2">
-              <a:schemeClr val="accent1">
-                <a:shade val="50000"/>
-              </a:schemeClr>
-            </a:lnRef>
-            <a:fillRef idx="1">
-              <a:schemeClr val="accent1"/>
-            </a:fillRef>
-            <a:effectRef idx="0">
-              <a:schemeClr val="accent1"/>
-            </a:effectRef>
-            <a:fontRef idx="minor">
-              <a:schemeClr val="lt1"/>
-            </a:fontRef>
-          </p:style>
-          <p:txBody>
-            <a:bodyPr>
-              <a:spAutoFit/>
-            </a:bodyPr>
-            <a:lstStyle/>
-            <a:p>
-              <a:pPr>
-                <a:defRPr/>
-              </a:pPr>
-              <a:r>
-                <a:rPr lang="en-US" sz="2400">
-                  <a:cs typeface="Lucida Sans Unicode" pitchFamily="34" charset="0"/>
-                </a:rPr>
-                <a:t>String </a:t>
-              </a:r>
-              <a:r>
-                <a:rPr lang="en-US" sz="2400" err="1">
-                  <a:cs typeface="Lucida Sans Unicode" pitchFamily="34" charset="0"/>
-                </a:rPr>
-                <a:t>toString</a:t>
-              </a:r>
-              <a:r>
-                <a:rPr lang="en-US" sz="2400">
-                  <a:cs typeface="Lucida Sans Unicode" pitchFamily="34" charset="0"/>
-                </a:rPr>
-                <a:t>()</a:t>
-              </a:r>
-            </a:p>
-            <a:p>
-              <a:pPr>
-                <a:defRPr/>
-              </a:pPr>
-              <a:r>
-                <a:rPr lang="en-US" sz="2400" err="1">
-                  <a:cs typeface="Lucida Sans Unicode" pitchFamily="34" charset="0"/>
-                </a:rPr>
-                <a:t>boolean</a:t>
-              </a:r>
-              <a:r>
-                <a:rPr lang="en-US" sz="2400">
-                  <a:cs typeface="Lucida Sans Unicode" pitchFamily="34" charset="0"/>
-                </a:rPr>
-                <a:t> </a:t>
-              </a:r>
-              <a:r>
-                <a:rPr lang="en-US" sz="2400" err="1">
-                  <a:cs typeface="Lucida Sans Unicode" pitchFamily="34" charset="0"/>
-                </a:rPr>
-                <a:t>isPalindrome</a:t>
-              </a:r>
-              <a:r>
-                <a:rPr lang="en-US" sz="2400">
-                  <a:cs typeface="Lucida Sans Unicode" pitchFamily="34" charset="0"/>
-                </a:rPr>
-                <a:t>()</a:t>
-              </a:r>
-            </a:p>
-          </p:txBody>
-        </p:sp>
-      </p:grpSp>
-    </p:spTree>
-    <p:extLst>
-      <p:ext uri="{BB962C8B-B14F-4D97-AF65-F5344CB8AC3E}">
-        <p14:creationId xmlns:p14="http://schemas.microsoft.com/office/powerpoint/2010/main" val="3815621099"/>
-      </p:ext>
-    </p:extLst>
-  </p:cSld>
-  <p:clrMapOvr>
-    <a:masterClrMapping/>
-  </p:clrMapOvr>
-</p:sld>
-</file>
-
 <file path=ppt/slides/slide8.xml><?xml version="1.0" encoding="utf-8"?>
 <p:sld xmlns:a="http://schemas.openxmlformats.org/drawingml/2006/main" xmlns:r="http://schemas.openxmlformats.org/officeDocument/2006/relationships" xmlns:p="http://schemas.openxmlformats.org/presentationml/2006/main">
   <p:cSld>
@@ -11238,7 +12098,13 @@
       </p:grpSpPr>
       <p:sp>
         <p:nvSpPr>
-          <p:cNvPr id="3" name="Title 2"/>
+          <p:cNvPr id="2" name="Title 1">
+            <a:extLst>
+              <a:ext uri="{FF2B5EF4-FFF2-40B4-BE49-F238E27FC236}">
+                <a16:creationId xmlns:a16="http://schemas.microsoft.com/office/drawing/2014/main" id="{896BD5A6-F5D1-3EE5-848A-F066AAA0FEAC}"/>
+              </a:ext>
+            </a:extLst>
+          </p:cNvPr>
           <p:cNvSpPr>
             <a:spLocks noGrp="1"/>
           </p:cNvSpPr>
@@ -11252,94 +12118,76 @@
           <a:lstStyle/>
           <a:p>
             <a:r>
-              <a:rPr lang="en-US"/>
-              <a:t>Practice </a:t>
-            </a:r>
-            <a:r>
-              <a:rPr lang="en-US" err="1"/>
-              <a:t>Practice</a:t>
-            </a:r>
-            <a:r>
-              <a:rPr lang="en-US"/>
-              <a:t> </a:t>
-            </a:r>
-            <a:r>
-              <a:rPr lang="en-US" err="1"/>
-              <a:t>Practice</a:t>
-            </a:r>
-            <a:endParaRPr lang="en-US"/>
-          </a:p>
-        </p:txBody>
-      </p:sp>
-      <p:sp>
-        <p:nvSpPr>
-          <p:cNvPr id="2" name="Content Placeholder 1"/>
-          <p:cNvSpPr>
-            <a:spLocks noGrp="1"/>
-          </p:cNvSpPr>
-          <p:nvPr>
-            <p:ph idx="1"/>
-          </p:nvPr>
-        </p:nvSpPr>
-        <p:spPr/>
-        <p:txBody>
-          <a:bodyPr/>
-          <a:lstStyle/>
-          <a:p>
-            <a:r>
-              <a:rPr lang="en-US"/>
-              <a:t>Head to </a:t>
-            </a:r>
-            <a:r>
-              <a:rPr lang="en-US">
-                <a:hlinkClick r:id="rId3"/>
-              </a:rPr>
-              <a:t>http://codingbat.com/java/Recursion-1</a:t>
-            </a:r>
-            <a:r>
-              <a:rPr lang="en-US"/>
-              <a:t> and solve 5 problems.  I personally like </a:t>
-            </a:r>
-            <a:r>
-              <a:rPr lang="en-US" err="1"/>
-              <a:t>bunnyEars</a:t>
-            </a:r>
-            <a:r>
-              <a:rPr lang="en-US"/>
-              <a:t>, bunnyEars2, count7, </a:t>
-            </a:r>
-            <a:r>
-              <a:rPr lang="en-US" err="1"/>
-              <a:t>fibonacci</a:t>
-            </a:r>
-            <a:r>
-              <a:rPr lang="en-US"/>
-              <a:t>, and </a:t>
-            </a:r>
-            <a:r>
-              <a:rPr lang="en-US" err="1"/>
-              <a:t>noX</a:t>
-            </a:r>
-            <a:endParaRPr lang="en-US"/>
-          </a:p>
-          <a:p>
-            <a:r>
-              <a:rPr lang="en-US"/>
-              <a:t>Get help from me if you get stuck</a:t>
-            </a:r>
-          </a:p>
-          <a:p>
-            <a:r>
-              <a:rPr lang="en-US"/>
-              <a:t>Then take a look at the recursion homework</a:t>
-            </a:r>
-          </a:p>
-        </p:txBody>
-      </p:sp>
+              <a:rPr lang="en-US" dirty="0"/>
+              <a:t>Open Today’s Quiz</a:t>
+            </a:r>
+          </a:p>
+        </p:txBody>
+      </p:sp>
+      <p:pic>
+        <p:nvPicPr>
+          <p:cNvPr id="5" name="Picture 4">
+            <a:extLst>
+              <a:ext uri="{FF2B5EF4-FFF2-40B4-BE49-F238E27FC236}">
+                <a16:creationId xmlns:a16="http://schemas.microsoft.com/office/drawing/2014/main" id="{5976BA0A-2B8E-CED7-F80B-4AC9E6B8BBF6}"/>
+              </a:ext>
+            </a:extLst>
+          </p:cNvPr>
+          <p:cNvPicPr>
+            <a:picLocks noChangeAspect="1"/>
+          </p:cNvPicPr>
+          <p:nvPr/>
+        </p:nvPicPr>
+        <p:blipFill>
+          <a:blip r:embed="rId2"/>
+          <a:stretch>
+            <a:fillRect/>
+          </a:stretch>
+        </p:blipFill>
+        <p:spPr>
+          <a:xfrm>
+            <a:off x="272005" y="1607325"/>
+            <a:ext cx="7106642" cy="3296110"/>
+          </a:xfrm>
+          <a:prstGeom prst="rect">
+            <a:avLst/>
+          </a:prstGeom>
+        </p:spPr>
+      </p:pic>
+      <p:pic>
+        <p:nvPicPr>
+          <p:cNvPr id="7" name="Picture 6">
+            <a:extLst>
+              <a:ext uri="{FF2B5EF4-FFF2-40B4-BE49-F238E27FC236}">
+                <a16:creationId xmlns:a16="http://schemas.microsoft.com/office/drawing/2014/main" id="{35762D41-4919-D93E-FC5F-09F292DE52E5}"/>
+              </a:ext>
+            </a:extLst>
+          </p:cNvPr>
+          <p:cNvPicPr>
+            <a:picLocks noChangeAspect="1"/>
+          </p:cNvPicPr>
+          <p:nvPr/>
+        </p:nvPicPr>
+        <p:blipFill>
+          <a:blip r:embed="rId3"/>
+          <a:stretch>
+            <a:fillRect/>
+          </a:stretch>
+        </p:blipFill>
+        <p:spPr>
+          <a:xfrm>
+            <a:off x="4451778" y="4579628"/>
+            <a:ext cx="4420217" cy="2143424"/>
+          </a:xfrm>
+          <a:prstGeom prst="rect">
+            <a:avLst/>
+          </a:prstGeom>
+        </p:spPr>
+      </p:pic>
     </p:spTree>
     <p:extLst>
       <p:ext uri="{BB962C8B-B14F-4D97-AF65-F5344CB8AC3E}">
-        <p14:creationId xmlns:p14="http://schemas.microsoft.com/office/powerpoint/2010/main" val="375092834"/>
+        <p14:creationId xmlns:p14="http://schemas.microsoft.com/office/powerpoint/2010/main" val="1277616453"/>
       </p:ext>
     </p:extLst>
   </p:cSld>
@@ -11368,83 +12216,98 @@
       </p:grpSpPr>
       <p:sp>
         <p:nvSpPr>
-          <p:cNvPr id="2" name="Title 1">
+          <p:cNvPr id="3" name="Title 2"/>
+          <p:cNvSpPr>
+            <a:spLocks noGrp="1"/>
+          </p:cNvSpPr>
+          <p:nvPr>
+            <p:ph type="title"/>
+          </p:nvPr>
+        </p:nvSpPr>
+        <p:spPr>
+          <a:xfrm>
+            <a:off x="173620" y="172157"/>
+            <a:ext cx="5561635" cy="1143000"/>
+          </a:xfrm>
+        </p:spPr>
+        <p:txBody>
+          <a:bodyPr/>
+          <a:lstStyle/>
+          <a:p>
+            <a:pPr>
+              <a:defRPr/>
+            </a:pPr>
+            <a:r>
+              <a:rPr lang="en-US" dirty="0"/>
+              <a:t>Programming Problem</a:t>
+            </a:r>
+          </a:p>
+        </p:txBody>
+      </p:sp>
+      <p:pic>
+        <p:nvPicPr>
+          <p:cNvPr id="9" name="Picture 8">
             <a:extLst>
               <a:ext uri="{FF2B5EF4-FFF2-40B4-BE49-F238E27FC236}">
-                <a16:creationId xmlns:a16="http://schemas.microsoft.com/office/drawing/2014/main" id="{31137CE5-564D-865C-64C2-E3000DB491C1}"/>
+                <a16:creationId xmlns:a16="http://schemas.microsoft.com/office/drawing/2014/main" id="{8B84BDC9-F59A-4FBD-1C1D-3E520B0DF2EF}"/>
               </a:ext>
             </a:extLst>
           </p:cNvPr>
-          <p:cNvSpPr>
-            <a:spLocks noGrp="1"/>
-          </p:cNvSpPr>
-          <p:nvPr>
-            <p:ph type="title"/>
-          </p:nvPr>
-        </p:nvSpPr>
-        <p:spPr/>
-        <p:txBody>
-          <a:bodyPr/>
-          <a:lstStyle/>
-          <a:p>
-            <a:r>
-              <a:rPr lang="en-US" dirty="0"/>
-              <a:t>Solutions</a:t>
-            </a:r>
-          </a:p>
-        </p:txBody>
-      </p:sp>
-      <p:sp>
-        <p:nvSpPr>
-          <p:cNvPr id="3" name="Content Placeholder 2">
+          <p:cNvPicPr>
+            <a:picLocks noChangeAspect="1"/>
+          </p:cNvPicPr>
+          <p:nvPr/>
+        </p:nvPicPr>
+        <p:blipFill>
+          <a:blip r:embed="rId3"/>
+          <a:stretch>
+            <a:fillRect/>
+          </a:stretch>
+        </p:blipFill>
+        <p:spPr>
+          <a:xfrm>
+            <a:off x="173620" y="1591258"/>
+            <a:ext cx="8796759" cy="5094585"/>
+          </a:xfrm>
+          <a:prstGeom prst="rect">
+            <a:avLst/>
+          </a:prstGeom>
+        </p:spPr>
+      </p:pic>
+      <p:pic>
+        <p:nvPicPr>
+          <p:cNvPr id="11" name="Picture 10">
             <a:extLst>
               <a:ext uri="{FF2B5EF4-FFF2-40B4-BE49-F238E27FC236}">
-                <a16:creationId xmlns:a16="http://schemas.microsoft.com/office/drawing/2014/main" id="{C31F3CF6-EF17-6536-E2F4-A1B9324C5815}"/>
+                <a16:creationId xmlns:a16="http://schemas.microsoft.com/office/drawing/2014/main" id="{4E8E10B2-5346-6827-6F76-2F352E51DB09}"/>
               </a:ext>
             </a:extLst>
           </p:cNvPr>
-          <p:cNvSpPr>
-            <a:spLocks noGrp="1"/>
-          </p:cNvSpPr>
-          <p:nvPr>
-            <p:ph idx="1"/>
-          </p:nvPr>
-        </p:nvSpPr>
-        <p:spPr/>
-        <p:txBody>
-          <a:bodyPr/>
-          <a:lstStyle/>
-          <a:p>
-            <a:r>
-              <a:rPr lang="en-US" dirty="0">
-                <a:solidFill>
-                  <a:schemeClr val="bg1"/>
-                </a:solidFill>
-                <a:highlight>
-                  <a:srgbClr val="FF0000"/>
-                </a:highlight>
-              </a:rPr>
-              <a:t>LOOKING AT THESE BEFORE ATTEMPTING THEM WILL NOT BE LIKELY TO HELP YOU</a:t>
-            </a:r>
-          </a:p>
-          <a:p>
-            <a:r>
-              <a:rPr lang="en-US" dirty="0"/>
-              <a:t>It is OK to look if you have completed them</a:t>
-            </a:r>
-          </a:p>
-          <a:p>
-            <a:r>
-              <a:rPr lang="en-US" dirty="0"/>
-              <a:t>It is OK to look at only one if you have spent a significant time (10+ minutes) and feel stuck</a:t>
-            </a:r>
-          </a:p>
-        </p:txBody>
-      </p:sp>
+          <p:cNvPicPr>
+            <a:picLocks noChangeAspect="1"/>
+          </p:cNvPicPr>
+          <p:nvPr/>
+        </p:nvPicPr>
+        <p:blipFill>
+          <a:blip r:embed="rId4"/>
+          <a:stretch>
+            <a:fillRect/>
+          </a:stretch>
+        </p:blipFill>
+        <p:spPr>
+          <a:xfrm>
+            <a:off x="5927869" y="351222"/>
+            <a:ext cx="3042510" cy="747045"/>
+          </a:xfrm>
+          <a:prstGeom prst="rect">
+            <a:avLst/>
+          </a:prstGeom>
+        </p:spPr>
+      </p:pic>
     </p:spTree>
     <p:extLst>
       <p:ext uri="{BB962C8B-B14F-4D97-AF65-F5344CB8AC3E}">
-        <p14:creationId xmlns:p14="http://schemas.microsoft.com/office/powerpoint/2010/main" val="3934717956"/>
+        <p14:creationId xmlns:p14="http://schemas.microsoft.com/office/powerpoint/2010/main" val="3815621099"/>
       </p:ext>
     </p:extLst>
   </p:cSld>
@@ -12303,21 +13166,6 @@
 </file>
 
 <file path=customXml/item1.xml><?xml version="1.0" encoding="utf-8"?>
-<?mso-contentType ?>
-<FormTemplates xmlns="http://schemas.microsoft.com/sharepoint/v3/contenttype/forms">
-  <Display>DocumentLibraryForm</Display>
-  <Edit>DocumentLibraryForm</Edit>
-  <New>DocumentLibraryForm</New>
-</FormTemplates>
-</file>
-
-<file path=customXml/item2.xml><?xml version="1.0" encoding="utf-8"?>
-<p:properties xmlns:p="http://schemas.microsoft.com/office/2006/metadata/properties" xmlns:xsi="http://www.w3.org/2001/XMLSchema-instance" xmlns:pc="http://schemas.microsoft.com/office/infopath/2007/PartnerControls">
-  <documentManagement/>
-</p:properties>
-</file>
-
-<file path=customXml/item3.xml><?xml version="1.0" encoding="utf-8"?>
 <ct:contentTypeSchema xmlns:ct="http://schemas.microsoft.com/office/2006/metadata/contentType" xmlns:ma="http://schemas.microsoft.com/office/2006/metadata/properties/metaAttributes" ct:_="" ma:_="" ma:contentTypeName="Document" ma:contentTypeID="0x0101001570BCAAD2E4294F9443DCB038A55380" ma:contentTypeVersion="8" ma:contentTypeDescription="Create a new document." ma:contentTypeScope="" ma:versionID="9523c79d6bab9e2ad858b5223ec5ed94">
   <xsd:schema xmlns:xsd="http://www.w3.org/2001/XMLSchema" xmlns:xs="http://www.w3.org/2001/XMLSchema" xmlns:p="http://schemas.microsoft.com/office/2006/metadata/properties" xmlns:ns2="201674f6-2bdd-4f13-ba1e-424e4aa70473" targetNamespace="http://schemas.microsoft.com/office/2006/metadata/properties" ma:root="true" ma:fieldsID="587afc94f70b507ec5be5f4d78229b0b" ns2:_="">
     <xsd:import namespace="201674f6-2bdd-4f13-ba1e-424e4aa70473"/>
@@ -12487,24 +13335,22 @@
 </ct:contentTypeSchema>
 </file>
 
-<file path=customXml/itemProps1.xml><?xml version="1.0" encoding="utf-8"?>
-<ds:datastoreItem xmlns:ds="http://schemas.openxmlformats.org/officeDocument/2006/customXml" ds:itemID="{D7A2D136-A07E-491F-8A29-C33D59830E5F}">
-  <ds:schemaRefs>
-    <ds:schemaRef ds:uri="http://schemas.microsoft.com/sharepoint/v3/contenttype/forms"/>
-  </ds:schemaRefs>
-</ds:datastoreItem>
+<file path=customXml/item2.xml><?xml version="1.0" encoding="utf-8"?>
+<?mso-contentType ?>
+<FormTemplates xmlns="http://schemas.microsoft.com/sharepoint/v3/contenttype/forms">
+  <Display>DocumentLibraryForm</Display>
+  <Edit>DocumentLibraryForm</Edit>
+  <New>DocumentLibraryForm</New>
+</FormTemplates>
 </file>
 
-<file path=customXml/itemProps2.xml><?xml version="1.0" encoding="utf-8"?>
-<ds:datastoreItem xmlns:ds="http://schemas.openxmlformats.org/officeDocument/2006/customXml" ds:itemID="{FD33B0F3-2535-4F7A-A1E2-AD3F32468655}">
-  <ds:schemaRefs>
-    <ds:schemaRef ds:uri="http://schemas.microsoft.com/office/2006/metadata/properties"/>
-    <ds:schemaRef ds:uri="http://schemas.microsoft.com/office/infopath/2007/PartnerControls"/>
-  </ds:schemaRefs>
-</ds:datastoreItem>
+<file path=customXml/item3.xml><?xml version="1.0" encoding="utf-8"?>
+<p:properties xmlns:p="http://schemas.microsoft.com/office/2006/metadata/properties" xmlns:xsi="http://www.w3.org/2001/XMLSchema-instance" xmlns:pc="http://schemas.microsoft.com/office/infopath/2007/PartnerControls">
+  <documentManagement/>
+</p:properties>
 </file>
 
-<file path=customXml/itemProps3.xml><?xml version="1.0" encoding="utf-8"?>
+<file path=customXml/itemProps1.xml><?xml version="1.0" encoding="utf-8"?>
 <ds:datastoreItem xmlns:ds="http://schemas.openxmlformats.org/officeDocument/2006/customXml" ds:itemID="{C751AB62-1EC3-4D5A-8827-F4B85E824CC1}">
   <ds:schemaRefs>
     <ds:schemaRef ds:uri="http://schemas.microsoft.com/office/2006/metadata/contentType"/>
@@ -12520,4 +13366,21 @@
     <ds:schemaRef ds:uri="http://schemas.microsoft.com/internal/obd"/>
   </ds:schemaRefs>
 </ds:datastoreItem>
+</file>
+
+<file path=customXml/itemProps2.xml><?xml version="1.0" encoding="utf-8"?>
+<ds:datastoreItem xmlns:ds="http://schemas.openxmlformats.org/officeDocument/2006/customXml" ds:itemID="{D7A2D136-A07E-491F-8A29-C33D59830E5F}">
+  <ds:schemaRefs>
+    <ds:schemaRef ds:uri="http://schemas.microsoft.com/sharepoint/v3/contenttype/forms"/>
+  </ds:schemaRefs>
+</ds:datastoreItem>
+</file>
+
+<file path=customXml/itemProps3.xml><?xml version="1.0" encoding="utf-8"?>
+<ds:datastoreItem xmlns:ds="http://schemas.openxmlformats.org/officeDocument/2006/customXml" ds:itemID="{FD33B0F3-2535-4F7A-A1E2-AD3F32468655}">
+  <ds:schemaRefs>
+    <ds:schemaRef ds:uri="http://schemas.microsoft.com/office/2006/metadata/properties"/>
+    <ds:schemaRef ds:uri="http://schemas.microsoft.com/office/infopath/2007/PartnerControls"/>
+  </ds:schemaRefs>
+</ds:datastoreItem>
 </file>
</xml_diff>